<commit_message>
uwu new pptx ben on the train
</commit_message>
<xml_diff>
--- a/console/5580_console.pptx
+++ b/console/5580_console.pptx
@@ -6,13 +6,16 @@
   </p:sldMasterIdLst>
   <p:sldIdLst>
     <p:sldId id="256" r:id="rId2"/>
-    <p:sldId id="257" r:id="rId3"/>
-    <p:sldId id="258" r:id="rId4"/>
-    <p:sldId id="260" r:id="rId5"/>
-    <p:sldId id="261" r:id="rId6"/>
-    <p:sldId id="259" r:id="rId7"/>
-    <p:sldId id="262" r:id="rId8"/>
-    <p:sldId id="263" r:id="rId9"/>
+    <p:sldId id="264" r:id="rId3"/>
+    <p:sldId id="269" r:id="rId4"/>
+    <p:sldId id="266" r:id="rId5"/>
+    <p:sldId id="257" r:id="rId6"/>
+    <p:sldId id="258" r:id="rId7"/>
+    <p:sldId id="260" r:id="rId8"/>
+    <p:sldId id="261" r:id="rId9"/>
+    <p:sldId id="259" r:id="rId10"/>
+    <p:sldId id="262" r:id="rId11"/>
+    <p:sldId id="263" r:id="rId12"/>
   </p:sldIdLst>
   <p:sldSz cx="12192000" cy="6858000"/>
   <p:notesSz cx="6858000" cy="9144000"/>
@@ -111,6 +114,11 @@
       </a:defRPr>
     </a:lvl9pPr>
   </p:defaultTextStyle>
+  <p:extLst>
+    <p:ext uri="{EFAFB233-063F-42B5-8137-9DF3F51BA10A}">
+      <p15:sldGuideLst xmlns:p15="http://schemas.microsoft.com/office/powerpoint/2012/main"/>
+    </p:ext>
+  </p:extLst>
 </p:presentation>
 </file>
 
@@ -6073,8 +6081,51 @@
           <a:p>
             <a:r>
               <a:rPr lang="en-US" dirty="0"/>
-              <a:t>BY CHRIS STAMPER</a:t>
-            </a:r>
+              <a:t>BY CHRIS STAMPER FT. BEN ‘TIGER PAWS’ </a:t>
+            </a:r>
+            <a:r>
+              <a:rPr lang="en-US" dirty="0" err="1"/>
+              <a:t>Sbanotto</a:t>
+            </a:r>
+            <a:endParaRPr lang="en-US" dirty="0"/>
+          </a:p>
+        </p:txBody>
+      </p:sp>
+      <p:sp>
+        <p:nvSpPr>
+          <p:cNvPr id="5" name="TextBox 4">
+            <a:extLst>
+              <a:ext uri="{FF2B5EF4-FFF2-40B4-BE49-F238E27FC236}">
+                <a16:creationId xmlns:a16="http://schemas.microsoft.com/office/drawing/2014/main" id="{1E46F3FA-D91F-7898-7723-352D90AEED4D}"/>
+              </a:ext>
+            </a:extLst>
+          </p:cNvPr>
+          <p:cNvSpPr txBox="1"/>
+          <p:nvPr/>
+        </p:nvSpPr>
+        <p:spPr>
+          <a:xfrm>
+            <a:off x="3047215" y="3237263"/>
+            <a:ext cx="6094428" cy="369332"/>
+          </a:xfrm>
+          <a:prstGeom prst="rect">
+            <a:avLst/>
+          </a:prstGeom>
+          <a:noFill/>
+        </p:spPr>
+        <p:txBody>
+          <a:bodyPr wrap="square">
+            <a:spAutoFit/>
+          </a:bodyPr>
+          <a:lstStyle/>
+          <a:p>
+            <a:r>
+              <a:rPr lang="en-US" b="0" dirty="0">
+                <a:effectLst/>
+              </a:rPr>
+              <a:t> </a:t>
+            </a:r>
+            <a:endParaRPr lang="en-US" dirty="0"/>
           </a:p>
         </p:txBody>
       </p:sp>
@@ -6091,1067 +6142,7 @@
 </p:sld>
 </file>
 
-<file path=ppt/slides/slide2.xml><?xml version="1.0" encoding="utf-8"?>
-<p:sld xmlns:a="http://schemas.openxmlformats.org/drawingml/2006/main" xmlns:r="http://schemas.openxmlformats.org/officeDocument/2006/relationships" xmlns:p="http://schemas.openxmlformats.org/presentationml/2006/main">
-  <p:cSld>
-    <p:spTree>
-      <p:nvGrpSpPr>
-        <p:cNvPr id="1" name=""/>
-        <p:cNvGrpSpPr/>
-        <p:nvPr/>
-      </p:nvGrpSpPr>
-      <p:grpSpPr>
-        <a:xfrm>
-          <a:off x="0" y="0"/>
-          <a:ext cx="0" cy="0"/>
-          <a:chOff x="0" y="0"/>
-          <a:chExt cx="0" cy="0"/>
-        </a:xfrm>
-      </p:grpSpPr>
-      <p:sp>
-        <p:nvSpPr>
-          <p:cNvPr id="2" name="Title 1">
-            <a:extLst>
-              <a:ext uri="{FF2B5EF4-FFF2-40B4-BE49-F238E27FC236}">
-                <a16:creationId xmlns:a16="http://schemas.microsoft.com/office/drawing/2014/main" id="{93D3F7A9-CFFD-F204-C2D8-753CAC29C54F}"/>
-              </a:ext>
-            </a:extLst>
-          </p:cNvPr>
-          <p:cNvSpPr>
-            <a:spLocks noGrp="1"/>
-          </p:cNvSpPr>
-          <p:nvPr>
-            <p:ph type="title"/>
-          </p:nvPr>
-        </p:nvSpPr>
-        <p:spPr>
-          <a:xfrm>
-            <a:off x="646111" y="452718"/>
-            <a:ext cx="9404723" cy="763340"/>
-          </a:xfrm>
-        </p:spPr>
-        <p:txBody>
-          <a:bodyPr/>
-          <a:lstStyle/>
-          <a:p>
-            <a:r>
-              <a:rPr lang="en-US" dirty="0" err="1"/>
-              <a:t>PyPack</a:t>
-            </a:r>
-            <a:endParaRPr lang="en-US" dirty="0"/>
-          </a:p>
-        </p:txBody>
-      </p:sp>
-      <p:pic>
-        <p:nvPicPr>
-          <p:cNvPr id="5" name="Content Placeholder 4">
-            <a:extLst>
-              <a:ext uri="{FF2B5EF4-FFF2-40B4-BE49-F238E27FC236}">
-                <a16:creationId xmlns:a16="http://schemas.microsoft.com/office/drawing/2014/main" id="{60F42B29-240E-2BA8-A41D-E1DED7D5599D}"/>
-              </a:ext>
-            </a:extLst>
-          </p:cNvPr>
-          <p:cNvPicPr>
-            <a:picLocks noGrp="1" noChangeAspect="1"/>
-          </p:cNvPicPr>
-          <p:nvPr>
-            <p:ph idx="1"/>
-          </p:nvPr>
-        </p:nvPicPr>
-        <p:blipFill>
-          <a:blip r:embed="rId2"/>
-          <a:stretch>
-            <a:fillRect/>
-          </a:stretch>
-        </p:blipFill>
-        <p:spPr>
-          <a:xfrm>
-            <a:off x="8881460" y="1412314"/>
-            <a:ext cx="2949179" cy="4992968"/>
-          </a:xfrm>
-        </p:spPr>
-      </p:pic>
-      <p:sp>
-        <p:nvSpPr>
-          <p:cNvPr id="6" name="TextBox 5">
-            <a:extLst>
-              <a:ext uri="{FF2B5EF4-FFF2-40B4-BE49-F238E27FC236}">
-                <a16:creationId xmlns:a16="http://schemas.microsoft.com/office/drawing/2014/main" id="{B8BAF3B9-61C3-FE58-06EB-C95815CEDB3D}"/>
-              </a:ext>
-            </a:extLst>
-          </p:cNvPr>
-          <p:cNvSpPr txBox="1"/>
-          <p:nvPr/>
-        </p:nvSpPr>
-        <p:spPr>
-          <a:xfrm>
-            <a:off x="395926" y="1536569"/>
-            <a:ext cx="8276734" cy="4955203"/>
-          </a:xfrm>
-          <a:prstGeom prst="rect">
-            <a:avLst/>
-          </a:prstGeom>
-          <a:noFill/>
-        </p:spPr>
-        <p:txBody>
-          <a:bodyPr wrap="square" rtlCol="0">
-            <a:spAutoFit/>
-          </a:bodyPr>
-          <a:lstStyle/>
-          <a:p>
-            <a:r>
-              <a:rPr lang="en-US" sz="2800" dirty="0"/>
-              <a:t>Python packages help us stay organized! This way, similar tools, files, features, etc. can be grouped together.</a:t>
-            </a:r>
-            <a:br>
-              <a:rPr lang="en-US" sz="2800" dirty="0"/>
-            </a:br>
-            <a:r>
-              <a:rPr lang="en-US" sz="2800" dirty="0"/>
-              <a:t> </a:t>
-            </a:r>
-            <a:br>
-              <a:rPr lang="en-US" sz="2800" dirty="0"/>
-            </a:br>
-            <a:r>
-              <a:rPr lang="en-US" sz="2800" dirty="0"/>
-              <a:t>Packages are </a:t>
-            </a:r>
-            <a:r>
-              <a:rPr lang="en-US" sz="2800" dirty="0" err="1"/>
-              <a:t>distinquished</a:t>
-            </a:r>
-            <a:r>
-              <a:rPr lang="en-US" sz="2800" dirty="0"/>
-              <a:t> from directories by their __init__.py files; these files can either contain initialization code or be blank.</a:t>
-            </a:r>
-            <a:br>
-              <a:rPr lang="en-US" sz="2800" dirty="0"/>
-            </a:br>
-            <a:br>
-              <a:rPr lang="en-US" sz="2800" dirty="0"/>
-            </a:br>
-            <a:r>
-              <a:rPr lang="en-US" sz="2800" dirty="0"/>
-              <a:t>Packages can be used in multiple separate scripts simultaneously.</a:t>
-            </a:r>
-          </a:p>
-          <a:p>
-            <a:endParaRPr lang="en-US" dirty="0"/>
-          </a:p>
-          <a:p>
-            <a:endParaRPr lang="en-US" dirty="0"/>
-          </a:p>
-        </p:txBody>
-      </p:sp>
-    </p:spTree>
-    <p:extLst>
-      <p:ext uri="{BB962C8B-B14F-4D97-AF65-F5344CB8AC3E}">
-        <p14:creationId xmlns:p14="http://schemas.microsoft.com/office/powerpoint/2010/main" val="1583055521"/>
-      </p:ext>
-    </p:extLst>
-  </p:cSld>
-  <p:clrMapOvr>
-    <a:masterClrMapping/>
-  </p:clrMapOvr>
-</p:sld>
-</file>
-
-<file path=ppt/slides/slide3.xml><?xml version="1.0" encoding="utf-8"?>
-<p:sld xmlns:a="http://schemas.openxmlformats.org/drawingml/2006/main" xmlns:r="http://schemas.openxmlformats.org/officeDocument/2006/relationships" xmlns:p="http://schemas.openxmlformats.org/presentationml/2006/main">
-  <p:cSld>
-    <p:spTree>
-      <p:nvGrpSpPr>
-        <p:cNvPr id="1" name=""/>
-        <p:cNvGrpSpPr/>
-        <p:nvPr/>
-      </p:nvGrpSpPr>
-      <p:grpSpPr>
-        <a:xfrm>
-          <a:off x="0" y="0"/>
-          <a:ext cx="0" cy="0"/>
-          <a:chOff x="0" y="0"/>
-          <a:chExt cx="0" cy="0"/>
-        </a:xfrm>
-      </p:grpSpPr>
-      <p:sp>
-        <p:nvSpPr>
-          <p:cNvPr id="2" name="Title 1">
-            <a:extLst>
-              <a:ext uri="{FF2B5EF4-FFF2-40B4-BE49-F238E27FC236}">
-                <a16:creationId xmlns:a16="http://schemas.microsoft.com/office/drawing/2014/main" id="{93D3F7A9-CFFD-F204-C2D8-753CAC29C54F}"/>
-              </a:ext>
-            </a:extLst>
-          </p:cNvPr>
-          <p:cNvSpPr>
-            <a:spLocks noGrp="1"/>
-          </p:cNvSpPr>
-          <p:nvPr>
-            <p:ph type="title"/>
-          </p:nvPr>
-        </p:nvSpPr>
-        <p:spPr/>
-        <p:txBody>
-          <a:bodyPr/>
-          <a:lstStyle/>
-          <a:p>
-            <a:r>
-              <a:rPr lang="en-US" dirty="0" err="1"/>
-              <a:t>cmd</a:t>
-            </a:r>
-            <a:r>
-              <a:rPr lang="en-US" dirty="0"/>
-              <a:t> Module</a:t>
-            </a:r>
-          </a:p>
-        </p:txBody>
-      </p:sp>
-      <p:pic>
-        <p:nvPicPr>
-          <p:cNvPr id="9" name="Content Placeholder 8">
-            <a:extLst>
-              <a:ext uri="{FF2B5EF4-FFF2-40B4-BE49-F238E27FC236}">
-                <a16:creationId xmlns:a16="http://schemas.microsoft.com/office/drawing/2014/main" id="{8E829D18-D6C7-3E6F-339B-161EE14D4EE6}"/>
-              </a:ext>
-            </a:extLst>
-          </p:cNvPr>
-          <p:cNvPicPr>
-            <a:picLocks noGrp="1" noChangeAspect="1"/>
-          </p:cNvPicPr>
-          <p:nvPr>
-            <p:ph idx="1"/>
-          </p:nvPr>
-        </p:nvPicPr>
-        <p:blipFill>
-          <a:blip r:embed="rId2">
-            <a:extLst>
-              <a:ext uri="{28A0092B-C50C-407E-A947-70E740481C1C}">
-                <a14:useLocalDpi xmlns:a14="http://schemas.microsoft.com/office/drawing/2010/main" val="0"/>
-              </a:ext>
-            </a:extLst>
-          </a:blip>
-          <a:stretch>
-            <a:fillRect/>
-          </a:stretch>
-        </p:blipFill>
-        <p:spPr>
-          <a:xfrm>
-            <a:off x="8138245" y="1656712"/>
-            <a:ext cx="3825178" cy="4195762"/>
-          </a:xfrm>
-        </p:spPr>
-      </p:pic>
-      <p:sp>
-        <p:nvSpPr>
-          <p:cNvPr id="10" name="TextBox 9">
-            <a:extLst>
-              <a:ext uri="{FF2B5EF4-FFF2-40B4-BE49-F238E27FC236}">
-                <a16:creationId xmlns:a16="http://schemas.microsoft.com/office/drawing/2014/main" id="{C0534385-0367-79B0-9647-8943422F56BA}"/>
-              </a:ext>
-            </a:extLst>
-          </p:cNvPr>
-          <p:cNvSpPr txBox="1"/>
-          <p:nvPr/>
-        </p:nvSpPr>
-        <p:spPr>
-          <a:xfrm>
-            <a:off x="228577" y="1656712"/>
-            <a:ext cx="7758260" cy="4062651"/>
-          </a:xfrm>
-          <a:prstGeom prst="rect">
-            <a:avLst/>
-          </a:prstGeom>
-          <a:noFill/>
-        </p:spPr>
-        <p:txBody>
-          <a:bodyPr wrap="square" rtlCol="0">
-            <a:spAutoFit/>
-          </a:bodyPr>
-          <a:lstStyle/>
-          <a:p>
-            <a:pPr marL="342900" indent="-342900">
-              <a:buAutoNum type="arabicPeriod"/>
-            </a:pPr>
-            <a:r>
-              <a:rPr lang="en-US" sz="2400" dirty="0"/>
-              <a:t>First import the </a:t>
-            </a:r>
-            <a:r>
-              <a:rPr lang="en-US" sz="2400" dirty="0" err="1"/>
-              <a:t>cmd</a:t>
-            </a:r>
-            <a:r>
-              <a:rPr lang="en-US" sz="2400" dirty="0"/>
-              <a:t> module</a:t>
-            </a:r>
-          </a:p>
-          <a:p>
-            <a:pPr marL="342900" indent="-342900">
-              <a:buAutoNum type="arabicPeriod"/>
-            </a:pPr>
-            <a:r>
-              <a:rPr lang="en-US" sz="2400" dirty="0"/>
-              <a:t>Create a class that inherits from the </a:t>
-            </a:r>
-            <a:r>
-              <a:rPr lang="en-US" sz="2400" dirty="0" err="1"/>
-              <a:t>cmd.Cmd</a:t>
-            </a:r>
-            <a:endParaRPr lang="en-US" sz="2400" dirty="0"/>
-          </a:p>
-          <a:p>
-            <a:pPr marL="342900" indent="-342900">
-              <a:buAutoNum type="arabicPeriod"/>
-            </a:pPr>
-            <a:r>
-              <a:rPr lang="en-US" sz="2400" dirty="0"/>
-              <a:t>Create a .</a:t>
-            </a:r>
-            <a:r>
-              <a:rPr lang="en-US" sz="2400" dirty="0" err="1"/>
-              <a:t>cmdloop</a:t>
-            </a:r>
-            <a:r>
-              <a:rPr lang="en-US" sz="2400" dirty="0"/>
-              <a:t>() of said class (</a:t>
-            </a:r>
-            <a:r>
-              <a:rPr lang="en-US" sz="2400" dirty="0" err="1"/>
-              <a:t>class_here.cmdloop</a:t>
-            </a:r>
-            <a:r>
-              <a:rPr lang="en-US" sz="2400" dirty="0"/>
-              <a:t>())</a:t>
-            </a:r>
-          </a:p>
-          <a:p>
-            <a:pPr marL="342900" indent="-342900">
-              <a:buAutoNum type="arabicPeriod"/>
-            </a:pPr>
-            <a:r>
-              <a:rPr lang="en-US" sz="2400" dirty="0"/>
-              <a:t>Set the prompt to be displayed based on </a:t>
-            </a:r>
-            <a:r>
-              <a:rPr lang="en-US" sz="2400" dirty="0" err="1"/>
-              <a:t>tty</a:t>
-            </a:r>
-            <a:r>
-              <a:rPr lang="en-US" sz="2400" dirty="0"/>
-              <a:t> mode</a:t>
-            </a:r>
-          </a:p>
-          <a:p>
-            <a:pPr marL="342900" indent="-342900">
-              <a:buAutoNum type="arabicPeriod"/>
-            </a:pPr>
-            <a:r>
-              <a:rPr lang="en-US" sz="2400" dirty="0"/>
-              <a:t>Returning True breaks us out of the loop!</a:t>
-            </a:r>
-          </a:p>
-          <a:p>
-            <a:pPr marL="342900" indent="-342900">
-              <a:buAutoNum type="arabicPeriod"/>
-            </a:pPr>
-            <a:r>
-              <a:rPr lang="en-US" sz="2400" dirty="0"/>
-              <a:t>EOF (End of File) signal shortcut remains </a:t>
-            </a:r>
-            <a:r>
-              <a:rPr lang="en-US" sz="2400" dirty="0" err="1"/>
-              <a:t>Ctrl+D</a:t>
-            </a:r>
-            <a:r>
-              <a:rPr lang="en-US" sz="2400" dirty="0"/>
-              <a:t> (</a:t>
-            </a:r>
-            <a:r>
-              <a:rPr lang="en-US" sz="2400" dirty="0" err="1"/>
-              <a:t>do_EOF</a:t>
-            </a:r>
-            <a:r>
-              <a:rPr lang="en-US" sz="2400" dirty="0"/>
-              <a:t>)</a:t>
-            </a:r>
-          </a:p>
-          <a:p>
-            <a:pPr marL="342900" indent="-342900">
-              <a:buFontTx/>
-              <a:buAutoNum type="arabicPeriod"/>
-            </a:pPr>
-            <a:r>
-              <a:rPr lang="en-US" sz="2400" dirty="0"/>
-              <a:t>You now have a CLI similar to Simple Shell &gt;:D</a:t>
-            </a:r>
-          </a:p>
-          <a:p>
-            <a:pPr marL="342900" indent="-342900">
-              <a:buAutoNum type="arabicPeriod"/>
-            </a:pPr>
-            <a:endParaRPr lang="en-US" dirty="0"/>
-          </a:p>
-        </p:txBody>
-      </p:sp>
-    </p:spTree>
-    <p:extLst>
-      <p:ext uri="{BB962C8B-B14F-4D97-AF65-F5344CB8AC3E}">
-        <p14:creationId xmlns:p14="http://schemas.microsoft.com/office/powerpoint/2010/main" val="2402145529"/>
-      </p:ext>
-    </p:extLst>
-  </p:cSld>
-  <p:clrMapOvr>
-    <a:masterClrMapping/>
-  </p:clrMapOvr>
-</p:sld>
-</file>
-
-<file path=ppt/slides/slide4.xml><?xml version="1.0" encoding="utf-8"?>
-<p:sld xmlns:a="http://schemas.openxmlformats.org/drawingml/2006/main" xmlns:r="http://schemas.openxmlformats.org/officeDocument/2006/relationships" xmlns:p="http://schemas.openxmlformats.org/presentationml/2006/main">
-  <p:cSld>
-    <p:spTree>
-      <p:nvGrpSpPr>
-        <p:cNvPr id="1" name=""/>
-        <p:cNvGrpSpPr/>
-        <p:nvPr/>
-      </p:nvGrpSpPr>
-      <p:grpSpPr>
-        <a:xfrm>
-          <a:off x="0" y="0"/>
-          <a:ext cx="0" cy="0"/>
-          <a:chOff x="0" y="0"/>
-          <a:chExt cx="0" cy="0"/>
-        </a:xfrm>
-      </p:grpSpPr>
-      <p:sp>
-        <p:nvSpPr>
-          <p:cNvPr id="2" name="Title 1">
-            <a:extLst>
-              <a:ext uri="{FF2B5EF4-FFF2-40B4-BE49-F238E27FC236}">
-                <a16:creationId xmlns:a16="http://schemas.microsoft.com/office/drawing/2014/main" id="{93D3F7A9-CFFD-F204-C2D8-753CAC29C54F}"/>
-              </a:ext>
-            </a:extLst>
-          </p:cNvPr>
-          <p:cNvSpPr>
-            <a:spLocks noGrp="1"/>
-          </p:cNvSpPr>
-          <p:nvPr>
-            <p:ph type="title"/>
-          </p:nvPr>
-        </p:nvSpPr>
-        <p:spPr/>
-        <p:txBody>
-          <a:bodyPr/>
-          <a:lstStyle/>
-          <a:p>
-            <a:r>
-              <a:rPr lang="en-US" dirty="0"/>
-              <a:t>Testing test tests</a:t>
-            </a:r>
-          </a:p>
-        </p:txBody>
-      </p:sp>
-      <p:sp>
-        <p:nvSpPr>
-          <p:cNvPr id="3" name="Content Placeholder 2">
-            <a:extLst>
-              <a:ext uri="{FF2B5EF4-FFF2-40B4-BE49-F238E27FC236}">
-                <a16:creationId xmlns:a16="http://schemas.microsoft.com/office/drawing/2014/main" id="{A4F3318C-6AA4-BDDF-5101-32A3A4650D02}"/>
-              </a:ext>
-            </a:extLst>
-          </p:cNvPr>
-          <p:cNvSpPr>
-            <a:spLocks noGrp="1"/>
-          </p:cNvSpPr>
-          <p:nvPr>
-            <p:ph idx="1"/>
-          </p:nvPr>
-        </p:nvSpPr>
-        <p:spPr/>
-        <p:txBody>
-          <a:bodyPr>
-            <a:normAutofit/>
-          </a:bodyPr>
-          <a:lstStyle/>
-          <a:p>
-            <a:r>
-              <a:rPr lang="en-US" dirty="0"/>
-              <a:t>Your ‘tests’ directory usually goes at the base of your project repo.</a:t>
-            </a:r>
-          </a:p>
-          <a:p>
-            <a:r>
-              <a:rPr lang="en-US" dirty="0"/>
-              <a:t>Tests directory files mirror project architecture (e.g. /models/base.py is tested in /tests/</a:t>
-            </a:r>
-            <a:r>
-              <a:rPr lang="en-US" dirty="0" err="1"/>
-              <a:t>test_models</a:t>
-            </a:r>
-            <a:r>
-              <a:rPr lang="en-US" dirty="0"/>
-              <a:t>/test_base.py)</a:t>
-            </a:r>
-          </a:p>
-          <a:p>
-            <a:r>
-              <a:rPr lang="en-US" b="1" dirty="0"/>
-              <a:t>REMEMBER </a:t>
-            </a:r>
-            <a:r>
-              <a:rPr lang="en-US" dirty="0"/>
-              <a:t>to make a ‘tests/test_console.py’ even if it’s empty</a:t>
-            </a:r>
-          </a:p>
-          <a:p>
-            <a:r>
-              <a:rPr lang="en-US" dirty="0"/>
-              <a:t>Utilize setup &amp;&amp; teardown methods to govern behavior before and/or following a test (e.g. reset storage)</a:t>
-            </a:r>
-          </a:p>
-          <a:p>
-            <a:r>
-              <a:rPr lang="en-US" dirty="0"/>
-              <a:t>Have fun! Testing for test tests can be frustrating, so try to enjoy it.</a:t>
-            </a:r>
-          </a:p>
-          <a:p>
-            <a:r>
-              <a:rPr lang="en-US" dirty="0"/>
-              <a:t>python3 -m </a:t>
-            </a:r>
-            <a:r>
-              <a:rPr lang="en-US" dirty="0" err="1"/>
-              <a:t>unittest</a:t>
-            </a:r>
-            <a:r>
-              <a:rPr lang="en-US" dirty="0"/>
-              <a:t> discover tests</a:t>
-            </a:r>
-          </a:p>
-        </p:txBody>
-      </p:sp>
-    </p:spTree>
-    <p:extLst>
-      <p:ext uri="{BB962C8B-B14F-4D97-AF65-F5344CB8AC3E}">
-        <p14:creationId xmlns:p14="http://schemas.microsoft.com/office/powerpoint/2010/main" val="1296758433"/>
-      </p:ext>
-    </p:extLst>
-  </p:cSld>
-  <p:clrMapOvr>
-    <a:masterClrMapping/>
-  </p:clrMapOvr>
-</p:sld>
-</file>
-
-<file path=ppt/slides/slide5.xml><?xml version="1.0" encoding="utf-8"?>
-<p:sld xmlns:a="http://schemas.openxmlformats.org/drawingml/2006/main" xmlns:r="http://schemas.openxmlformats.org/officeDocument/2006/relationships" xmlns:p="http://schemas.openxmlformats.org/presentationml/2006/main">
-  <p:cSld>
-    <p:spTree>
-      <p:nvGrpSpPr>
-        <p:cNvPr id="1" name=""/>
-        <p:cNvGrpSpPr/>
-        <p:nvPr/>
-      </p:nvGrpSpPr>
-      <p:grpSpPr>
-        <a:xfrm>
-          <a:off x="0" y="0"/>
-          <a:ext cx="0" cy="0"/>
-          <a:chOff x="0" y="0"/>
-          <a:chExt cx="0" cy="0"/>
-        </a:xfrm>
-      </p:grpSpPr>
-      <p:sp>
-        <p:nvSpPr>
-          <p:cNvPr id="2" name="Title 1">
-            <a:extLst>
-              <a:ext uri="{FF2B5EF4-FFF2-40B4-BE49-F238E27FC236}">
-                <a16:creationId xmlns:a16="http://schemas.microsoft.com/office/drawing/2014/main" id="{93D3F7A9-CFFD-F204-C2D8-753CAC29C54F}"/>
-              </a:ext>
-            </a:extLst>
-          </p:cNvPr>
-          <p:cNvSpPr>
-            <a:spLocks noGrp="1"/>
-          </p:cNvSpPr>
-          <p:nvPr>
-            <p:ph type="title"/>
-          </p:nvPr>
-        </p:nvSpPr>
-        <p:spPr/>
-        <p:txBody>
-          <a:bodyPr/>
-          <a:lstStyle/>
-          <a:p>
-            <a:r>
-              <a:rPr lang="en-US" dirty="0"/>
-              <a:t>Meet Jason!</a:t>
-            </a:r>
-          </a:p>
-        </p:txBody>
-      </p:sp>
-      <p:sp>
-        <p:nvSpPr>
-          <p:cNvPr id="4" name="Content Placeholder 2">
-            <a:extLst>
-              <a:ext uri="{FF2B5EF4-FFF2-40B4-BE49-F238E27FC236}">
-                <a16:creationId xmlns:a16="http://schemas.microsoft.com/office/drawing/2014/main" id="{1884256D-97C8-8FF6-75CE-15438DE3B3A5}"/>
-              </a:ext>
-            </a:extLst>
-          </p:cNvPr>
-          <p:cNvSpPr>
-            <a:spLocks noGrp="1"/>
-          </p:cNvSpPr>
-          <p:nvPr>
-            <p:ph idx="1"/>
-          </p:nvPr>
-        </p:nvSpPr>
-        <p:spPr>
-          <a:xfrm>
-            <a:off x="1103313" y="2052638"/>
-            <a:ext cx="8947150" cy="4195762"/>
-          </a:xfrm>
-        </p:spPr>
-        <p:txBody>
-          <a:bodyPr/>
-          <a:lstStyle/>
-          <a:p>
-            <a:pPr algn="l">
-              <a:buFont typeface="Arial" panose="020B0604020202020204" pitchFamily="34" charset="0"/>
-              <a:buChar char="•"/>
-            </a:pPr>
-            <a:r>
-              <a:rPr lang="en-US" sz="2800" b="0" i="0" dirty="0">
-                <a:solidFill>
-                  <a:srgbClr val="D1D5DB"/>
-                </a:solidFill>
-                <a:effectLst/>
-                <a:latin typeface="Söhne"/>
-              </a:rPr>
-              <a:t>JSON stands for JavaScript Object Notation</a:t>
-            </a:r>
-          </a:p>
-          <a:p>
-            <a:pPr algn="l">
-              <a:buFont typeface="Arial" panose="020B0604020202020204" pitchFamily="34" charset="0"/>
-              <a:buChar char="•"/>
-            </a:pPr>
-            <a:r>
-              <a:rPr lang="en-US" sz="2800" b="0" i="0" dirty="0">
-                <a:solidFill>
-                  <a:srgbClr val="D1D5DB"/>
-                </a:solidFill>
-                <a:effectLst/>
-                <a:latin typeface="Söhne"/>
-              </a:rPr>
-              <a:t>JSON is a lightweight data-interchange format</a:t>
-            </a:r>
-          </a:p>
-          <a:p>
-            <a:pPr algn="l">
-              <a:buFont typeface="Arial" panose="020B0604020202020204" pitchFamily="34" charset="0"/>
-              <a:buChar char="•"/>
-            </a:pPr>
-            <a:r>
-              <a:rPr lang="en-US" sz="2800" b="0" i="0" dirty="0">
-                <a:solidFill>
-                  <a:srgbClr val="D1D5DB"/>
-                </a:solidFill>
-                <a:effectLst/>
-                <a:latin typeface="Söhne"/>
-              </a:rPr>
-              <a:t>It is easy for humans to read and write</a:t>
-            </a:r>
-          </a:p>
-          <a:p>
-            <a:pPr algn="l">
-              <a:buFont typeface="Arial" panose="020B0604020202020204" pitchFamily="34" charset="0"/>
-              <a:buChar char="•"/>
-            </a:pPr>
-            <a:r>
-              <a:rPr lang="en-US" sz="2800" b="0" i="0" dirty="0">
-                <a:solidFill>
-                  <a:srgbClr val="D1D5DB"/>
-                </a:solidFill>
-                <a:effectLst/>
-                <a:latin typeface="Söhne"/>
-              </a:rPr>
-              <a:t>It's easy for machines to parse and generate</a:t>
-            </a:r>
-          </a:p>
-          <a:p>
-            <a:pPr algn="l">
-              <a:buFont typeface="Arial" panose="020B0604020202020204" pitchFamily="34" charset="0"/>
-              <a:buChar char="•"/>
-            </a:pPr>
-            <a:r>
-              <a:rPr lang="en-US" sz="2800" b="0" i="0" dirty="0">
-                <a:solidFill>
-                  <a:srgbClr val="D1D5DB"/>
-                </a:solidFill>
-                <a:effectLst/>
-                <a:latin typeface="Söhne"/>
-              </a:rPr>
-              <a:t>JSON is a text format that is completely language independent</a:t>
-            </a:r>
-          </a:p>
-          <a:p>
-            <a:pPr algn="l">
-              <a:buFont typeface="Arial" panose="020B0604020202020204" pitchFamily="34" charset="0"/>
-              <a:buChar char="•"/>
-            </a:pPr>
-            <a:r>
-              <a:rPr lang="en-US" sz="2800" dirty="0">
-                <a:solidFill>
-                  <a:srgbClr val="D1D5DB"/>
-                </a:solidFill>
-                <a:latin typeface="Söhne"/>
-              </a:rPr>
-              <a:t>Python has built in </a:t>
-            </a:r>
-            <a:r>
-              <a:rPr lang="en-US" sz="2800" dirty="0" err="1">
-                <a:solidFill>
-                  <a:srgbClr val="D1D5DB"/>
-                </a:solidFill>
-                <a:latin typeface="Söhne"/>
-              </a:rPr>
-              <a:t>json</a:t>
-            </a:r>
-            <a:r>
-              <a:rPr lang="en-US" sz="2800" dirty="0">
-                <a:solidFill>
-                  <a:srgbClr val="D1D5DB"/>
-                </a:solidFill>
-                <a:latin typeface="Söhne"/>
-              </a:rPr>
-              <a:t> support (import </a:t>
-            </a:r>
-            <a:r>
-              <a:rPr lang="en-US" sz="2800" dirty="0" err="1">
-                <a:solidFill>
-                  <a:srgbClr val="D1D5DB"/>
-                </a:solidFill>
-                <a:latin typeface="Söhne"/>
-              </a:rPr>
-              <a:t>json</a:t>
-            </a:r>
-            <a:r>
-              <a:rPr lang="en-US" sz="2800" dirty="0">
-                <a:solidFill>
-                  <a:srgbClr val="D1D5DB"/>
-                </a:solidFill>
-                <a:latin typeface="Söhne"/>
-              </a:rPr>
-              <a:t>)</a:t>
-            </a:r>
-            <a:endParaRPr lang="en-US" sz="2800" b="0" i="0" dirty="0">
-              <a:solidFill>
-                <a:srgbClr val="D1D5DB"/>
-              </a:solidFill>
-              <a:effectLst/>
-              <a:latin typeface="Söhne"/>
-            </a:endParaRPr>
-          </a:p>
-          <a:p>
-            <a:pPr marL="0" indent="0">
-              <a:buNone/>
-            </a:pPr>
-            <a:endParaRPr lang="en-US" dirty="0"/>
-          </a:p>
-        </p:txBody>
-      </p:sp>
-    </p:spTree>
-    <p:extLst>
-      <p:ext uri="{BB962C8B-B14F-4D97-AF65-F5344CB8AC3E}">
-        <p14:creationId xmlns:p14="http://schemas.microsoft.com/office/powerpoint/2010/main" val="1380080184"/>
-      </p:ext>
-    </p:extLst>
-  </p:cSld>
-  <p:clrMapOvr>
-    <a:masterClrMapping/>
-  </p:clrMapOvr>
-</p:sld>
-</file>
-
-<file path=ppt/slides/slide6.xml><?xml version="1.0" encoding="utf-8"?>
-<p:sld xmlns:a="http://schemas.openxmlformats.org/drawingml/2006/main" xmlns:r="http://schemas.openxmlformats.org/officeDocument/2006/relationships" xmlns:p="http://schemas.openxmlformats.org/presentationml/2006/main">
-  <p:cSld>
-    <p:spTree>
-      <p:nvGrpSpPr>
-        <p:cNvPr id="1" name=""/>
-        <p:cNvGrpSpPr/>
-        <p:nvPr/>
-      </p:nvGrpSpPr>
-      <p:grpSpPr>
-        <a:xfrm>
-          <a:off x="0" y="0"/>
-          <a:ext cx="0" cy="0"/>
-          <a:chOff x="0" y="0"/>
-          <a:chExt cx="0" cy="0"/>
-        </a:xfrm>
-      </p:grpSpPr>
-      <p:sp>
-        <p:nvSpPr>
-          <p:cNvPr id="2" name="Title 1">
-            <a:extLst>
-              <a:ext uri="{FF2B5EF4-FFF2-40B4-BE49-F238E27FC236}">
-                <a16:creationId xmlns:a16="http://schemas.microsoft.com/office/drawing/2014/main" id="{93D3F7A9-CFFD-F204-C2D8-753CAC29C54F}"/>
-              </a:ext>
-            </a:extLst>
-          </p:cNvPr>
-          <p:cNvSpPr>
-            <a:spLocks noGrp="1"/>
-          </p:cNvSpPr>
-          <p:nvPr>
-            <p:ph type="title"/>
-          </p:nvPr>
-        </p:nvSpPr>
-        <p:spPr/>
-        <p:txBody>
-          <a:bodyPr/>
-          <a:lstStyle/>
-          <a:p>
-            <a:r>
-              <a:rPr lang="en-US" dirty="0"/>
-              <a:t>I’m Super Serial-</a:t>
-            </a:r>
-            <a:r>
-              <a:rPr lang="en-US" dirty="0" err="1"/>
-              <a:t>izing</a:t>
-            </a:r>
-            <a:endParaRPr lang="en-US" dirty="0"/>
-          </a:p>
-        </p:txBody>
-      </p:sp>
-      <p:sp>
-        <p:nvSpPr>
-          <p:cNvPr id="5" name="Content Placeholder 4">
-            <a:extLst>
-              <a:ext uri="{FF2B5EF4-FFF2-40B4-BE49-F238E27FC236}">
-                <a16:creationId xmlns:a16="http://schemas.microsoft.com/office/drawing/2014/main" id="{9F0B1957-B2F9-4BE4-7FBE-AE2CEF656DB0}"/>
-              </a:ext>
-            </a:extLst>
-          </p:cNvPr>
-          <p:cNvSpPr>
-            <a:spLocks noGrp="1"/>
-          </p:cNvSpPr>
-          <p:nvPr>
-            <p:ph idx="1"/>
-          </p:nvPr>
-        </p:nvSpPr>
-        <p:spPr>
-          <a:xfrm>
-            <a:off x="1263568" y="1383616"/>
-            <a:ext cx="8946541" cy="614868"/>
-          </a:xfrm>
-        </p:spPr>
-        <p:txBody>
-          <a:bodyPr>
-            <a:normAutofit fontScale="85000" lnSpcReduction="10000"/>
-          </a:bodyPr>
-          <a:lstStyle/>
-          <a:p>
-            <a:pPr marL="0" indent="0">
-              <a:buNone/>
-            </a:pPr>
-            <a:r>
-              <a:rPr lang="en-US" dirty="0"/>
-              <a:t>&lt;class '</a:t>
-            </a:r>
-            <a:r>
-              <a:rPr lang="en-US" dirty="0" err="1"/>
-              <a:t>BaseModel</a:t>
-            </a:r>
-            <a:r>
-              <a:rPr lang="en-US" dirty="0"/>
-              <a:t>'&gt; -&gt; </a:t>
-            </a:r>
-            <a:r>
-              <a:rPr lang="en-US" dirty="0" err="1"/>
-              <a:t>to_dict</a:t>
-            </a:r>
-            <a:r>
-              <a:rPr lang="en-US" dirty="0"/>
-              <a:t>() -&gt; &lt;class '</a:t>
-            </a:r>
-            <a:r>
-              <a:rPr lang="en-US" dirty="0" err="1"/>
-              <a:t>dict</a:t>
-            </a:r>
-            <a:r>
-              <a:rPr lang="en-US" dirty="0"/>
-              <a:t>'&gt; -&gt; JSON dump -&gt; &lt;class 'str'&gt; -&gt; FILE -&gt; &lt;class 'str'&gt; -&gt; JSON load -&gt; &lt;class '</a:t>
-            </a:r>
-            <a:r>
-              <a:rPr lang="en-US" dirty="0" err="1"/>
-              <a:t>dict</a:t>
-            </a:r>
-            <a:r>
-              <a:rPr lang="en-US" dirty="0"/>
-              <a:t>'&gt; -&gt; &lt;class '</a:t>
-            </a:r>
-            <a:r>
-              <a:rPr lang="en-US" dirty="0" err="1"/>
-              <a:t>BaseModel</a:t>
-            </a:r>
-            <a:r>
-              <a:rPr lang="en-US" dirty="0"/>
-              <a:t>'&gt;</a:t>
-            </a:r>
-          </a:p>
-        </p:txBody>
-      </p:sp>
-      <p:sp>
-        <p:nvSpPr>
-          <p:cNvPr id="8" name="TextBox 7">
-            <a:extLst>
-              <a:ext uri="{FF2B5EF4-FFF2-40B4-BE49-F238E27FC236}">
-                <a16:creationId xmlns:a16="http://schemas.microsoft.com/office/drawing/2014/main" id="{99DD621C-81AF-3A0B-6EA0-6E6733F79ABA}"/>
-              </a:ext>
-            </a:extLst>
-          </p:cNvPr>
-          <p:cNvSpPr txBox="1"/>
-          <p:nvPr/>
-        </p:nvSpPr>
-        <p:spPr>
-          <a:xfrm>
-            <a:off x="693621" y="2149311"/>
-            <a:ext cx="11080833" cy="2031325"/>
-          </a:xfrm>
-          <a:prstGeom prst="rect">
-            <a:avLst/>
-          </a:prstGeom>
-          <a:noFill/>
-        </p:spPr>
-        <p:txBody>
-          <a:bodyPr wrap="square" rtlCol="0">
-            <a:spAutoFit/>
-          </a:bodyPr>
-          <a:lstStyle/>
-          <a:p>
-            <a:r>
-              <a:rPr lang="en-US" dirty="0"/>
-              <a:t>{"Cereal.0b7b815f-137e-4d05-85db-95f8d4c840a7":</a:t>
-            </a:r>
-          </a:p>
-          <a:p>
-            <a:r>
-              <a:rPr lang="en-US" dirty="0"/>
-              <a:t>	{"id": "0b7b815f-137e-4d05-85db-95f8d4c840a7",</a:t>
-            </a:r>
-          </a:p>
-          <a:p>
-            <a:r>
-              <a:rPr lang="en-US" dirty="0"/>
-              <a:t>	 "</a:t>
-            </a:r>
-            <a:r>
-              <a:rPr lang="en-US" dirty="0" err="1"/>
-              <a:t>created_at</a:t>
-            </a:r>
-            <a:r>
-              <a:rPr lang="en-US" dirty="0"/>
-              <a:t>": "2023-06-07T06:04:43.109009", "</a:t>
-            </a:r>
-            <a:r>
-              <a:rPr lang="en-US" dirty="0" err="1"/>
-              <a:t>updated_at</a:t>
-            </a:r>
-            <a:r>
-              <a:rPr lang="en-US" dirty="0"/>
-              <a:t>": "2023-06-07T06:04:43.109159", 	   	 "name": "Cereal 19", "</a:t>
-            </a:r>
-            <a:r>
-              <a:rPr lang="en-US" dirty="0" err="1"/>
-              <a:t>sugar_content</a:t>
-            </a:r>
-            <a:r>
-              <a:rPr lang="en-US" dirty="0"/>
-              <a:t>": 99.99,</a:t>
-            </a:r>
-          </a:p>
-          <a:p>
-            <a:r>
-              <a:rPr lang="en-US" dirty="0"/>
-              <a:t>	 "</a:t>
-            </a:r>
-            <a:r>
-              <a:rPr lang="en-US" dirty="0" err="1"/>
-              <a:t>fiber_content</a:t>
-            </a:r>
-            <a:r>
-              <a:rPr lang="en-US" dirty="0"/>
-              <a:t>": 199.99, "</a:t>
-            </a:r>
-            <a:r>
-              <a:rPr lang="en-US" dirty="0" err="1"/>
-              <a:t>is_gluten_free</a:t>
-            </a:r>
-            <a:r>
-              <a:rPr lang="en-US" dirty="0"/>
-              <a:t>": true,</a:t>
-            </a:r>
-          </a:p>
-          <a:p>
-            <a:r>
-              <a:rPr lang="en-US" dirty="0"/>
-              <a:t>	 "</a:t>
-            </a:r>
-            <a:r>
-              <a:rPr lang="en-US" dirty="0" err="1"/>
-              <a:t>expiration_date</a:t>
-            </a:r>
-            <a:r>
-              <a:rPr lang="en-US" dirty="0"/>
-              <a:t>": "Neva Witches", "</a:t>
-            </a:r>
-            <a:r>
-              <a:rPr lang="en-US" dirty="0" err="1"/>
-              <a:t>shelf_life_days</a:t>
-            </a:r>
-            <a:r>
-              <a:rPr lang="en-US" dirty="0"/>
-              <a:t>": 365,</a:t>
-            </a:r>
-          </a:p>
-          <a:p>
-            <a:r>
-              <a:rPr lang="en-US" dirty="0"/>
-              <a:t>	 "</a:t>
-            </a:r>
-            <a:r>
-              <a:rPr lang="en-US" dirty="0" err="1"/>
-              <a:t>flavor_complexity</a:t>
-            </a:r>
-            <a:r>
-              <a:rPr lang="en-US" dirty="0"/>
-              <a:t>": "(2+3j)", "</a:t>
-            </a:r>
-            <a:r>
-              <a:rPr lang="en-US" dirty="0" err="1"/>
-              <a:t>other_cereals</a:t>
-            </a:r>
-            <a:r>
-              <a:rPr lang="en-US" dirty="0"/>
-              <a:t>": [], "__class__": "Cereal"}}</a:t>
-            </a:r>
-          </a:p>
-        </p:txBody>
-      </p:sp>
-    </p:spTree>
-    <p:extLst>
-      <p:ext uri="{BB962C8B-B14F-4D97-AF65-F5344CB8AC3E}">
-        <p14:creationId xmlns:p14="http://schemas.microsoft.com/office/powerpoint/2010/main" val="4284632038"/>
-      </p:ext>
-    </p:extLst>
-  </p:cSld>
-  <p:clrMapOvr>
-    <a:masterClrMapping/>
-  </p:clrMapOvr>
-</p:sld>
-</file>
-
-<file path=ppt/slides/slide7.xml><?xml version="1.0" encoding="utf-8"?>
+<file path=ppt/slides/slide10.xml><?xml version="1.0" encoding="utf-8"?>
 <p:sld xmlns:a="http://schemas.openxmlformats.org/drawingml/2006/main" xmlns:r="http://schemas.openxmlformats.org/officeDocument/2006/relationships" xmlns:p="http://schemas.openxmlformats.org/presentationml/2006/main">
   <p:cSld>
     <p:spTree>
@@ -7318,6 +6309,1307 @@
 </p:sld>
 </file>
 
+<file path=ppt/slides/slide11.xml><?xml version="1.0" encoding="utf-8"?>
+<p:sld xmlns:a="http://schemas.openxmlformats.org/drawingml/2006/main" xmlns:r="http://schemas.openxmlformats.org/officeDocument/2006/relationships" xmlns:p="http://schemas.openxmlformats.org/presentationml/2006/main">
+  <p:cSld>
+    <p:spTree>
+      <p:nvGrpSpPr>
+        <p:cNvPr id="1" name=""/>
+        <p:cNvGrpSpPr/>
+        <p:nvPr/>
+      </p:nvGrpSpPr>
+      <p:grpSpPr>
+        <a:xfrm>
+          <a:off x="0" y="0"/>
+          <a:ext cx="0" cy="0"/>
+          <a:chOff x="0" y="0"/>
+          <a:chExt cx="0" cy="0"/>
+        </a:xfrm>
+      </p:grpSpPr>
+      <p:sp>
+        <p:nvSpPr>
+          <p:cNvPr id="2" name="Title 1">
+            <a:extLst>
+              <a:ext uri="{FF2B5EF4-FFF2-40B4-BE49-F238E27FC236}">
+                <a16:creationId xmlns:a16="http://schemas.microsoft.com/office/drawing/2014/main" id="{93D3F7A9-CFFD-F204-C2D8-753CAC29C54F}"/>
+              </a:ext>
+            </a:extLst>
+          </p:cNvPr>
+          <p:cNvSpPr>
+            <a:spLocks noGrp="1"/>
+          </p:cNvSpPr>
+          <p:nvPr>
+            <p:ph type="title"/>
+          </p:nvPr>
+        </p:nvSpPr>
+        <p:spPr/>
+        <p:txBody>
+          <a:bodyPr/>
+          <a:lstStyle/>
+          <a:p>
+            <a:r>
+              <a:rPr lang="en-US" dirty="0"/>
+              <a:t>UWUID</a:t>
+            </a:r>
+          </a:p>
+        </p:txBody>
+      </p:sp>
+      <p:sp>
+        <p:nvSpPr>
+          <p:cNvPr id="3" name="Content Placeholder 2">
+            <a:extLst>
+              <a:ext uri="{FF2B5EF4-FFF2-40B4-BE49-F238E27FC236}">
+                <a16:creationId xmlns:a16="http://schemas.microsoft.com/office/drawing/2014/main" id="{A4F3318C-6AA4-BDDF-5101-32A3A4650D02}"/>
+              </a:ext>
+            </a:extLst>
+          </p:cNvPr>
+          <p:cNvSpPr>
+            <a:spLocks noGrp="1"/>
+          </p:cNvSpPr>
+          <p:nvPr>
+            <p:ph idx="1"/>
+          </p:nvPr>
+        </p:nvSpPr>
+        <p:spPr>
+          <a:xfrm>
+            <a:off x="358594" y="1411896"/>
+            <a:ext cx="11472045" cy="4993386"/>
+          </a:xfrm>
+        </p:spPr>
+        <p:txBody>
+          <a:bodyPr>
+            <a:normAutofit/>
+          </a:bodyPr>
+          <a:lstStyle/>
+          <a:p>
+            <a:r>
+              <a:rPr lang="en-US" sz="2600" dirty="0"/>
+              <a:t>UUID === ‘Universally Unique Identifier’</a:t>
+            </a:r>
+          </a:p>
+          <a:p>
+            <a:r>
+              <a:rPr lang="en-US" sz="2600" dirty="0"/>
+              <a:t>Format: 8-4-4-4-12 for a total of 36 characters</a:t>
+            </a:r>
+          </a:p>
+          <a:p>
+            <a:r>
+              <a:rPr lang="en-US" sz="2600" dirty="0"/>
+              <a:t>From </a:t>
+            </a:r>
+            <a:r>
+              <a:rPr lang="en-US" sz="2600" dirty="0" err="1"/>
+              <a:t>uuid</a:t>
+            </a:r>
+            <a:r>
+              <a:rPr lang="en-US" sz="2600" dirty="0"/>
+              <a:t> import uuid4 </a:t>
+            </a:r>
+            <a:r>
+              <a:rPr lang="en-US" sz="2600" dirty="0">
+                <a:sym typeface="Wingdings" panose="05000000000000000000" pitchFamily="2" charset="2"/>
+              </a:rPr>
+              <a:t> random number based</a:t>
+            </a:r>
+          </a:p>
+          <a:p>
+            <a:endParaRPr lang="en-US" sz="2600" dirty="0">
+              <a:sym typeface="Wingdings" panose="05000000000000000000" pitchFamily="2" charset="2"/>
+            </a:endParaRPr>
+          </a:p>
+          <a:p>
+            <a:pPr marL="0" indent="0">
+              <a:buNone/>
+            </a:pPr>
+            <a:r>
+              <a:rPr lang="en-US" sz="2600" dirty="0">
+                <a:sym typeface="Wingdings" panose="05000000000000000000" pitchFamily="2" charset="2"/>
+              </a:rPr>
+              <a:t>Helps us differentiate similar, but not the same, class instances</a:t>
+            </a:r>
+            <a:br>
+              <a:rPr lang="en-US" dirty="0">
+                <a:sym typeface="Wingdings" panose="05000000000000000000" pitchFamily="2" charset="2"/>
+              </a:rPr>
+            </a:br>
+            <a:br>
+              <a:rPr lang="en-US" dirty="0">
+                <a:sym typeface="Wingdings" panose="05000000000000000000" pitchFamily="2" charset="2"/>
+              </a:rPr>
+            </a:br>
+            <a:r>
+              <a:rPr lang="en-US" sz="1600" dirty="0">
+                <a:sym typeface="Wingdings" panose="05000000000000000000" pitchFamily="2" charset="2"/>
+              </a:rPr>
+              <a:t>e.g. [Cereal] (0b7b815f-137e-4d05-85db-95f8d4c840a7) {'id': '0b7b815f-137e-4d05-85db-95f8d4c840a7', '</a:t>
+            </a:r>
+            <a:r>
+              <a:rPr lang="en-US" sz="1600" dirty="0" err="1">
+                <a:sym typeface="Wingdings" panose="05000000000000000000" pitchFamily="2" charset="2"/>
+              </a:rPr>
+              <a:t>created_at</a:t>
+            </a:r>
+            <a:r>
+              <a:rPr lang="en-US" sz="1600" dirty="0">
+                <a:sym typeface="Wingdings" panose="05000000000000000000" pitchFamily="2" charset="2"/>
+              </a:rPr>
+              <a:t>': </a:t>
+            </a:r>
+            <a:r>
+              <a:rPr lang="en-US" sz="1600" dirty="0" err="1">
+                <a:sym typeface="Wingdings" panose="05000000000000000000" pitchFamily="2" charset="2"/>
+              </a:rPr>
+              <a:t>datetime.datetime</a:t>
+            </a:r>
+            <a:r>
+              <a:rPr lang="en-US" sz="1600" dirty="0">
+                <a:sym typeface="Wingdings" panose="05000000000000000000" pitchFamily="2" charset="2"/>
+              </a:rPr>
+              <a:t>(2023, 6, 7, 6, 4, 43, 109009), '</a:t>
+            </a:r>
+            <a:r>
+              <a:rPr lang="en-US" sz="1600" dirty="0" err="1">
+                <a:sym typeface="Wingdings" panose="05000000000000000000" pitchFamily="2" charset="2"/>
+              </a:rPr>
+              <a:t>updated_at</a:t>
+            </a:r>
+            <a:r>
+              <a:rPr lang="en-US" sz="1600" dirty="0">
+                <a:sym typeface="Wingdings" panose="05000000000000000000" pitchFamily="2" charset="2"/>
+              </a:rPr>
+              <a:t>': </a:t>
+            </a:r>
+            <a:r>
+              <a:rPr lang="en-US" sz="1600" dirty="0" err="1">
+                <a:sym typeface="Wingdings" panose="05000000000000000000" pitchFamily="2" charset="2"/>
+              </a:rPr>
+              <a:t>datetime.datetime</a:t>
+            </a:r>
+            <a:r>
+              <a:rPr lang="en-US" sz="1600" dirty="0">
+                <a:sym typeface="Wingdings" panose="05000000000000000000" pitchFamily="2" charset="2"/>
+              </a:rPr>
+              <a:t>(2023, 6, 7, 6, 4, 43, 109159), 'name': 'Cereal 19', '</a:t>
+            </a:r>
+            <a:r>
+              <a:rPr lang="en-US" sz="1600" dirty="0" err="1">
+                <a:sym typeface="Wingdings" panose="05000000000000000000" pitchFamily="2" charset="2"/>
+              </a:rPr>
+              <a:t>sugar_content</a:t>
+            </a:r>
+            <a:r>
+              <a:rPr lang="en-US" sz="1600" dirty="0">
+                <a:sym typeface="Wingdings" panose="05000000000000000000" pitchFamily="2" charset="2"/>
+              </a:rPr>
+              <a:t>': 99.99, '</a:t>
+            </a:r>
+            <a:r>
+              <a:rPr lang="en-US" sz="1600" dirty="0" err="1">
+                <a:sym typeface="Wingdings" panose="05000000000000000000" pitchFamily="2" charset="2"/>
+              </a:rPr>
+              <a:t>fiber_content</a:t>
+            </a:r>
+            <a:r>
+              <a:rPr lang="en-US" sz="1600" dirty="0">
+                <a:sym typeface="Wingdings" panose="05000000000000000000" pitchFamily="2" charset="2"/>
+              </a:rPr>
+              <a:t>': 199.99, '</a:t>
+            </a:r>
+            <a:r>
+              <a:rPr lang="en-US" sz="1600" dirty="0" err="1">
+                <a:sym typeface="Wingdings" panose="05000000000000000000" pitchFamily="2" charset="2"/>
+              </a:rPr>
+              <a:t>is_gluten_free</a:t>
+            </a:r>
+            <a:r>
+              <a:rPr lang="en-US" sz="1600" dirty="0">
+                <a:sym typeface="Wingdings" panose="05000000000000000000" pitchFamily="2" charset="2"/>
+              </a:rPr>
+              <a:t>': True, '</a:t>
+            </a:r>
+            <a:r>
+              <a:rPr lang="en-US" sz="1600" dirty="0" err="1">
+                <a:sym typeface="Wingdings" panose="05000000000000000000" pitchFamily="2" charset="2"/>
+              </a:rPr>
+              <a:t>expiration_date</a:t>
+            </a:r>
+            <a:r>
+              <a:rPr lang="en-US" sz="1600" dirty="0">
+                <a:sym typeface="Wingdings" panose="05000000000000000000" pitchFamily="2" charset="2"/>
+              </a:rPr>
+              <a:t>': 'Neva Witches', '</a:t>
+            </a:r>
+            <a:r>
+              <a:rPr lang="en-US" sz="1600" dirty="0" err="1">
+                <a:sym typeface="Wingdings" panose="05000000000000000000" pitchFamily="2" charset="2"/>
+              </a:rPr>
+              <a:t>shelf_life_days</a:t>
+            </a:r>
+            <a:r>
+              <a:rPr lang="en-US" sz="1600" dirty="0">
+                <a:sym typeface="Wingdings" panose="05000000000000000000" pitchFamily="2" charset="2"/>
+              </a:rPr>
+              <a:t>': 365, '</a:t>
+            </a:r>
+            <a:r>
+              <a:rPr lang="en-US" sz="1600" dirty="0" err="1">
+                <a:sym typeface="Wingdings" panose="05000000000000000000" pitchFamily="2" charset="2"/>
+              </a:rPr>
+              <a:t>flavor_complexity</a:t>
+            </a:r>
+            <a:r>
+              <a:rPr lang="en-US" sz="1600" dirty="0">
+                <a:sym typeface="Wingdings" panose="05000000000000000000" pitchFamily="2" charset="2"/>
+              </a:rPr>
+              <a:t>': '(2+3j)', '</a:t>
+            </a:r>
+            <a:r>
+              <a:rPr lang="en-US" sz="1600" dirty="0" err="1">
+                <a:sym typeface="Wingdings" panose="05000000000000000000" pitchFamily="2" charset="2"/>
+              </a:rPr>
+              <a:t>other_cereals</a:t>
+            </a:r>
+            <a:r>
+              <a:rPr lang="en-US" sz="1600" dirty="0">
+                <a:sym typeface="Wingdings" panose="05000000000000000000" pitchFamily="2" charset="2"/>
+              </a:rPr>
+              <a:t>': []}</a:t>
+            </a:r>
+          </a:p>
+          <a:p>
+            <a:pPr marL="0" indent="0">
+              <a:buNone/>
+            </a:pPr>
+            <a:r>
+              <a:rPr lang="en-US" sz="1600" dirty="0">
+                <a:sym typeface="Wingdings" panose="05000000000000000000" pitchFamily="2" charset="2"/>
+              </a:rPr>
+              <a:t>[Cereal] (f1f8ea78-d3ed-4b5f-8e88-ec31d9fcafba) {'id': 'f1f8ea78-d3ed-4b5f-8e88-ec31d9fcafba', '</a:t>
+            </a:r>
+            <a:r>
+              <a:rPr lang="en-US" sz="1600" dirty="0" err="1">
+                <a:sym typeface="Wingdings" panose="05000000000000000000" pitchFamily="2" charset="2"/>
+              </a:rPr>
+              <a:t>created_at</a:t>
+            </a:r>
+            <a:r>
+              <a:rPr lang="en-US" sz="1600" dirty="0">
+                <a:sym typeface="Wingdings" panose="05000000000000000000" pitchFamily="2" charset="2"/>
+              </a:rPr>
+              <a:t>': </a:t>
+            </a:r>
+            <a:r>
+              <a:rPr lang="en-US" sz="1600" dirty="0" err="1">
+                <a:sym typeface="Wingdings" panose="05000000000000000000" pitchFamily="2" charset="2"/>
+              </a:rPr>
+              <a:t>datetime.datetime</a:t>
+            </a:r>
+            <a:r>
+              <a:rPr lang="en-US" sz="1600" dirty="0">
+                <a:sym typeface="Wingdings" panose="05000000000000000000" pitchFamily="2" charset="2"/>
+              </a:rPr>
+              <a:t>(2023, 6, 7, 6, 25, 10, 97766), '</a:t>
+            </a:r>
+            <a:r>
+              <a:rPr lang="en-US" sz="1600" dirty="0" err="1">
+                <a:sym typeface="Wingdings" panose="05000000000000000000" pitchFamily="2" charset="2"/>
+              </a:rPr>
+              <a:t>updated_at</a:t>
+            </a:r>
+            <a:r>
+              <a:rPr lang="en-US" sz="1600" dirty="0">
+                <a:sym typeface="Wingdings" panose="05000000000000000000" pitchFamily="2" charset="2"/>
+              </a:rPr>
+              <a:t>': </a:t>
+            </a:r>
+            <a:r>
+              <a:rPr lang="en-US" sz="1600" dirty="0" err="1">
+                <a:sym typeface="Wingdings" panose="05000000000000000000" pitchFamily="2" charset="2"/>
+              </a:rPr>
+              <a:t>datetime.datetime</a:t>
+            </a:r>
+            <a:r>
+              <a:rPr lang="en-US" sz="1600" dirty="0">
+                <a:sym typeface="Wingdings" panose="05000000000000000000" pitchFamily="2" charset="2"/>
+              </a:rPr>
+              <a:t>(2023, 6, 7, 6, 25, 10, 98069), 'name': 'Cereal 19', '</a:t>
+            </a:r>
+            <a:r>
+              <a:rPr lang="en-US" sz="1600" dirty="0" err="1">
+                <a:sym typeface="Wingdings" panose="05000000000000000000" pitchFamily="2" charset="2"/>
+              </a:rPr>
+              <a:t>sugar_content</a:t>
+            </a:r>
+            <a:r>
+              <a:rPr lang="en-US" sz="1600" dirty="0">
+                <a:sym typeface="Wingdings" panose="05000000000000000000" pitchFamily="2" charset="2"/>
+              </a:rPr>
+              <a:t>': 99.99, '</a:t>
+            </a:r>
+            <a:r>
+              <a:rPr lang="en-US" sz="1600" dirty="0" err="1">
+                <a:sym typeface="Wingdings" panose="05000000000000000000" pitchFamily="2" charset="2"/>
+              </a:rPr>
+              <a:t>fiber_content</a:t>
+            </a:r>
+            <a:r>
+              <a:rPr lang="en-US" sz="1600" dirty="0">
+                <a:sym typeface="Wingdings" panose="05000000000000000000" pitchFamily="2" charset="2"/>
+              </a:rPr>
+              <a:t>': 199.99, '</a:t>
+            </a:r>
+            <a:r>
+              <a:rPr lang="en-US" sz="1600" dirty="0" err="1">
+                <a:sym typeface="Wingdings" panose="05000000000000000000" pitchFamily="2" charset="2"/>
+              </a:rPr>
+              <a:t>is_gluten_free</a:t>
+            </a:r>
+            <a:r>
+              <a:rPr lang="en-US" sz="1600" dirty="0">
+                <a:sym typeface="Wingdings" panose="05000000000000000000" pitchFamily="2" charset="2"/>
+              </a:rPr>
+              <a:t>': True, '</a:t>
+            </a:r>
+            <a:r>
+              <a:rPr lang="en-US" sz="1600" dirty="0" err="1">
+                <a:sym typeface="Wingdings" panose="05000000000000000000" pitchFamily="2" charset="2"/>
+              </a:rPr>
+              <a:t>expiration_date</a:t>
+            </a:r>
+            <a:r>
+              <a:rPr lang="en-US" sz="1600" dirty="0">
+                <a:sym typeface="Wingdings" panose="05000000000000000000" pitchFamily="2" charset="2"/>
+              </a:rPr>
+              <a:t>': 'Neva Witches', '</a:t>
+            </a:r>
+            <a:r>
+              <a:rPr lang="en-US" sz="1600" dirty="0" err="1">
+                <a:sym typeface="Wingdings" panose="05000000000000000000" pitchFamily="2" charset="2"/>
+              </a:rPr>
+              <a:t>shelf_life_days</a:t>
+            </a:r>
+            <a:r>
+              <a:rPr lang="en-US" sz="1600" dirty="0">
+                <a:sym typeface="Wingdings" panose="05000000000000000000" pitchFamily="2" charset="2"/>
+              </a:rPr>
+              <a:t>': 365, '</a:t>
+            </a:r>
+            <a:r>
+              <a:rPr lang="en-US" sz="1600" dirty="0" err="1">
+                <a:sym typeface="Wingdings" panose="05000000000000000000" pitchFamily="2" charset="2"/>
+              </a:rPr>
+              <a:t>flavor_complexity</a:t>
+            </a:r>
+            <a:r>
+              <a:rPr lang="en-US" sz="1600" dirty="0">
+                <a:sym typeface="Wingdings" panose="05000000000000000000" pitchFamily="2" charset="2"/>
+              </a:rPr>
+              <a:t>': (2+3j), '</a:t>
+            </a:r>
+            <a:r>
+              <a:rPr lang="en-US" sz="1600" dirty="0" err="1">
+                <a:sym typeface="Wingdings" panose="05000000000000000000" pitchFamily="2" charset="2"/>
+              </a:rPr>
+              <a:t>other_cereals</a:t>
+            </a:r>
+            <a:r>
+              <a:rPr lang="en-US" sz="1600" dirty="0">
+                <a:sym typeface="Wingdings" panose="05000000000000000000" pitchFamily="2" charset="2"/>
+              </a:rPr>
+              <a:t>': []}</a:t>
+            </a:r>
+            <a:endParaRPr lang="en-US" sz="1600" dirty="0"/>
+          </a:p>
+        </p:txBody>
+      </p:sp>
+    </p:spTree>
+    <p:extLst>
+      <p:ext uri="{BB962C8B-B14F-4D97-AF65-F5344CB8AC3E}">
+        <p14:creationId xmlns:p14="http://schemas.microsoft.com/office/powerpoint/2010/main" val="1957479903"/>
+      </p:ext>
+    </p:extLst>
+  </p:cSld>
+  <p:clrMapOvr>
+    <a:masterClrMapping/>
+  </p:clrMapOvr>
+</p:sld>
+</file>
+
+<file path=ppt/slides/slide2.xml><?xml version="1.0" encoding="utf-8"?>
+<p:sld xmlns:a="http://schemas.openxmlformats.org/drawingml/2006/main" xmlns:r="http://schemas.openxmlformats.org/officeDocument/2006/relationships" xmlns:p="http://schemas.openxmlformats.org/presentationml/2006/main">
+  <p:cSld>
+    <p:spTree>
+      <p:nvGrpSpPr>
+        <p:cNvPr id="1" name=""/>
+        <p:cNvGrpSpPr/>
+        <p:nvPr/>
+      </p:nvGrpSpPr>
+      <p:grpSpPr>
+        <a:xfrm>
+          <a:off x="0" y="0"/>
+          <a:ext cx="0" cy="0"/>
+          <a:chOff x="0" y="0"/>
+          <a:chExt cx="0" cy="0"/>
+        </a:xfrm>
+      </p:grpSpPr>
+      <p:sp>
+        <p:nvSpPr>
+          <p:cNvPr id="2" name="Title 1">
+            <a:extLst>
+              <a:ext uri="{FF2B5EF4-FFF2-40B4-BE49-F238E27FC236}">
+                <a16:creationId xmlns:a16="http://schemas.microsoft.com/office/drawing/2014/main" id="{55C9DF1C-3E03-9C28-DB74-52194C8CC9E7}"/>
+              </a:ext>
+            </a:extLst>
+          </p:cNvPr>
+          <p:cNvSpPr>
+            <a:spLocks noGrp="1"/>
+          </p:cNvSpPr>
+          <p:nvPr>
+            <p:ph type="title"/>
+          </p:nvPr>
+        </p:nvSpPr>
+        <p:spPr/>
+        <p:txBody>
+          <a:bodyPr/>
+          <a:lstStyle/>
+          <a:p>
+            <a:r>
+              <a:rPr lang="en-US" dirty="0"/>
+              <a:t>Ben Party Time</a:t>
+            </a:r>
+          </a:p>
+        </p:txBody>
+      </p:sp>
+      <p:pic>
+        <p:nvPicPr>
+          <p:cNvPr id="1026" name="Picture 2">
+            <a:extLst>
+              <a:ext uri="{FF2B5EF4-FFF2-40B4-BE49-F238E27FC236}">
+                <a16:creationId xmlns:a16="http://schemas.microsoft.com/office/drawing/2014/main" id="{C43FC89D-803B-44F4-4441-244DA8C21DA8}"/>
+              </a:ext>
+            </a:extLst>
+          </p:cNvPr>
+          <p:cNvPicPr>
+            <a:picLocks noGrp="1" noChangeAspect="1" noChangeArrowheads="1"/>
+          </p:cNvPicPr>
+          <p:nvPr>
+            <p:ph idx="1"/>
+          </p:nvPr>
+        </p:nvPicPr>
+        <p:blipFill>
+          <a:blip r:embed="rId2">
+            <a:extLst>
+              <a:ext uri="{28A0092B-C50C-407E-A947-70E740481C1C}">
+                <a14:useLocalDpi xmlns:a14="http://schemas.microsoft.com/office/drawing/2010/main" val="0"/>
+              </a:ext>
+            </a:extLst>
+          </a:blip>
+          <a:srcRect/>
+          <a:stretch>
+            <a:fillRect/>
+          </a:stretch>
+        </p:blipFill>
+        <p:spPr bwMode="auto">
+          <a:xfrm>
+            <a:off x="1635130" y="2052638"/>
+            <a:ext cx="7883516" cy="4195762"/>
+          </a:xfrm>
+          <a:prstGeom prst="rect">
+            <a:avLst/>
+          </a:prstGeom>
+          <a:noFill/>
+          <a:extLst>
+            <a:ext uri="{909E8E84-426E-40DD-AFC4-6F175D3DCCD1}">
+              <a14:hiddenFill xmlns:a14="http://schemas.microsoft.com/office/drawing/2010/main">
+                <a:solidFill>
+                  <a:srgbClr val="FFFFFF"/>
+                </a:solidFill>
+              </a14:hiddenFill>
+            </a:ext>
+          </a:extLst>
+        </p:spPr>
+      </p:pic>
+    </p:spTree>
+    <p:extLst>
+      <p:ext uri="{BB962C8B-B14F-4D97-AF65-F5344CB8AC3E}">
+        <p14:creationId xmlns:p14="http://schemas.microsoft.com/office/powerpoint/2010/main" val="1665464423"/>
+      </p:ext>
+    </p:extLst>
+  </p:cSld>
+  <p:clrMapOvr>
+    <a:masterClrMapping/>
+  </p:clrMapOvr>
+</p:sld>
+</file>
+
+<file path=ppt/slides/slide3.xml><?xml version="1.0" encoding="utf-8"?>
+<p:sld xmlns:a="http://schemas.openxmlformats.org/drawingml/2006/main" xmlns:r="http://schemas.openxmlformats.org/officeDocument/2006/relationships" xmlns:p="http://schemas.openxmlformats.org/presentationml/2006/main">
+  <p:cSld>
+    <p:spTree>
+      <p:nvGrpSpPr>
+        <p:cNvPr id="1" name=""/>
+        <p:cNvGrpSpPr/>
+        <p:nvPr/>
+      </p:nvGrpSpPr>
+      <p:grpSpPr>
+        <a:xfrm>
+          <a:off x="0" y="0"/>
+          <a:ext cx="0" cy="0"/>
+          <a:chOff x="0" y="0"/>
+          <a:chExt cx="0" cy="0"/>
+        </a:xfrm>
+      </p:grpSpPr>
+      <p:sp>
+        <p:nvSpPr>
+          <p:cNvPr id="2" name="Title 1">
+            <a:extLst>
+              <a:ext uri="{FF2B5EF4-FFF2-40B4-BE49-F238E27FC236}">
+                <a16:creationId xmlns:a16="http://schemas.microsoft.com/office/drawing/2014/main" id="{EF3F9DC4-20C9-E522-4C4F-730C3EB3DBC4}"/>
+              </a:ext>
+            </a:extLst>
+          </p:cNvPr>
+          <p:cNvSpPr>
+            <a:spLocks noGrp="1"/>
+          </p:cNvSpPr>
+          <p:nvPr>
+            <p:ph type="title"/>
+          </p:nvPr>
+        </p:nvSpPr>
+        <p:spPr/>
+        <p:txBody>
+          <a:bodyPr/>
+          <a:lstStyle/>
+          <a:p>
+            <a:r>
+              <a:rPr lang="en-US" dirty="0"/>
+              <a:t>Ben Party Time</a:t>
+            </a:r>
+          </a:p>
+        </p:txBody>
+      </p:sp>
+      <p:pic>
+        <p:nvPicPr>
+          <p:cNvPr id="2050" name="Picture 2">
+            <a:extLst>
+              <a:ext uri="{FF2B5EF4-FFF2-40B4-BE49-F238E27FC236}">
+                <a16:creationId xmlns:a16="http://schemas.microsoft.com/office/drawing/2014/main" id="{34BC594A-01DF-8145-E1FD-97E31E8CA512}"/>
+              </a:ext>
+            </a:extLst>
+          </p:cNvPr>
+          <p:cNvPicPr>
+            <a:picLocks noGrp="1" noChangeAspect="1" noChangeArrowheads="1"/>
+          </p:cNvPicPr>
+          <p:nvPr>
+            <p:ph idx="1"/>
+          </p:nvPr>
+        </p:nvPicPr>
+        <p:blipFill>
+          <a:blip r:embed="rId2">
+            <a:extLst>
+              <a:ext uri="{28A0092B-C50C-407E-A947-70E740481C1C}">
+                <a14:useLocalDpi xmlns:a14="http://schemas.microsoft.com/office/drawing/2010/main" val="0"/>
+              </a:ext>
+            </a:extLst>
+          </a:blip>
+          <a:srcRect/>
+          <a:stretch>
+            <a:fillRect/>
+          </a:stretch>
+        </p:blipFill>
+        <p:spPr bwMode="auto">
+          <a:xfrm>
+            <a:off x="1635130" y="2052638"/>
+            <a:ext cx="7883516" cy="4195762"/>
+          </a:xfrm>
+          <a:prstGeom prst="rect">
+            <a:avLst/>
+          </a:prstGeom>
+          <a:noFill/>
+          <a:extLst>
+            <a:ext uri="{909E8E84-426E-40DD-AFC4-6F175D3DCCD1}">
+              <a14:hiddenFill xmlns:a14="http://schemas.microsoft.com/office/drawing/2010/main">
+                <a:solidFill>
+                  <a:srgbClr val="FFFFFF"/>
+                </a:solidFill>
+              </a14:hiddenFill>
+            </a:ext>
+          </a:extLst>
+        </p:spPr>
+      </p:pic>
+    </p:spTree>
+    <p:extLst>
+      <p:ext uri="{BB962C8B-B14F-4D97-AF65-F5344CB8AC3E}">
+        <p14:creationId xmlns:p14="http://schemas.microsoft.com/office/powerpoint/2010/main" val="3379433843"/>
+      </p:ext>
+    </p:extLst>
+  </p:cSld>
+  <p:clrMapOvr>
+    <a:masterClrMapping/>
+  </p:clrMapOvr>
+</p:sld>
+</file>
+
+<file path=ppt/slides/slide4.xml><?xml version="1.0" encoding="utf-8"?>
+<p:sld xmlns:a="http://schemas.openxmlformats.org/drawingml/2006/main" xmlns:r="http://schemas.openxmlformats.org/officeDocument/2006/relationships" xmlns:p="http://schemas.openxmlformats.org/presentationml/2006/main">
+  <p:cSld>
+    <p:spTree>
+      <p:nvGrpSpPr>
+        <p:cNvPr id="1" name=""/>
+        <p:cNvGrpSpPr/>
+        <p:nvPr/>
+      </p:nvGrpSpPr>
+      <p:grpSpPr>
+        <a:xfrm>
+          <a:off x="0" y="0"/>
+          <a:ext cx="0" cy="0"/>
+          <a:chOff x="0" y="0"/>
+          <a:chExt cx="0" cy="0"/>
+        </a:xfrm>
+      </p:grpSpPr>
+      <p:sp>
+        <p:nvSpPr>
+          <p:cNvPr id="2" name="Title 1">
+            <a:extLst>
+              <a:ext uri="{FF2B5EF4-FFF2-40B4-BE49-F238E27FC236}">
+                <a16:creationId xmlns:a16="http://schemas.microsoft.com/office/drawing/2014/main" id="{EF3F9DC4-20C9-E522-4C4F-730C3EB3DBC4}"/>
+              </a:ext>
+            </a:extLst>
+          </p:cNvPr>
+          <p:cNvSpPr>
+            <a:spLocks noGrp="1"/>
+          </p:cNvSpPr>
+          <p:nvPr>
+            <p:ph type="title"/>
+          </p:nvPr>
+        </p:nvSpPr>
+        <p:spPr/>
+        <p:txBody>
+          <a:bodyPr/>
+          <a:lstStyle/>
+          <a:p>
+            <a:r>
+              <a:rPr lang="en-US" dirty="0"/>
+              <a:t>Ben Party Time</a:t>
+            </a:r>
+          </a:p>
+        </p:txBody>
+      </p:sp>
+      <p:pic>
+        <p:nvPicPr>
+          <p:cNvPr id="3074" name="Picture 2">
+            <a:extLst>
+              <a:ext uri="{FF2B5EF4-FFF2-40B4-BE49-F238E27FC236}">
+                <a16:creationId xmlns:a16="http://schemas.microsoft.com/office/drawing/2014/main" id="{E65122C6-8B13-61D7-0B59-63F18B02D839}"/>
+              </a:ext>
+            </a:extLst>
+          </p:cNvPr>
+          <p:cNvPicPr>
+            <a:picLocks noGrp="1" noChangeAspect="1" noChangeArrowheads="1"/>
+          </p:cNvPicPr>
+          <p:nvPr>
+            <p:ph idx="1"/>
+          </p:nvPr>
+        </p:nvPicPr>
+        <p:blipFill>
+          <a:blip r:embed="rId2">
+            <a:extLst>
+              <a:ext uri="{28A0092B-C50C-407E-A947-70E740481C1C}">
+                <a14:useLocalDpi xmlns:a14="http://schemas.microsoft.com/office/drawing/2010/main" val="0"/>
+              </a:ext>
+            </a:extLst>
+          </a:blip>
+          <a:srcRect/>
+          <a:stretch>
+            <a:fillRect/>
+          </a:stretch>
+        </p:blipFill>
+        <p:spPr bwMode="auto">
+          <a:xfrm>
+            <a:off x="1635130" y="2052638"/>
+            <a:ext cx="7883516" cy="4195762"/>
+          </a:xfrm>
+          <a:prstGeom prst="rect">
+            <a:avLst/>
+          </a:prstGeom>
+          <a:noFill/>
+          <a:extLst>
+            <a:ext uri="{909E8E84-426E-40DD-AFC4-6F175D3DCCD1}">
+              <a14:hiddenFill xmlns:a14="http://schemas.microsoft.com/office/drawing/2010/main">
+                <a:solidFill>
+                  <a:srgbClr val="FFFFFF"/>
+                </a:solidFill>
+              </a14:hiddenFill>
+            </a:ext>
+          </a:extLst>
+        </p:spPr>
+      </p:pic>
+    </p:spTree>
+    <p:extLst>
+      <p:ext uri="{BB962C8B-B14F-4D97-AF65-F5344CB8AC3E}">
+        <p14:creationId xmlns:p14="http://schemas.microsoft.com/office/powerpoint/2010/main" val="795863300"/>
+      </p:ext>
+    </p:extLst>
+  </p:cSld>
+  <p:clrMapOvr>
+    <a:masterClrMapping/>
+  </p:clrMapOvr>
+</p:sld>
+</file>
+
+<file path=ppt/slides/slide5.xml><?xml version="1.0" encoding="utf-8"?>
+<p:sld xmlns:a="http://schemas.openxmlformats.org/drawingml/2006/main" xmlns:r="http://schemas.openxmlformats.org/officeDocument/2006/relationships" xmlns:p="http://schemas.openxmlformats.org/presentationml/2006/main">
+  <p:cSld>
+    <p:spTree>
+      <p:nvGrpSpPr>
+        <p:cNvPr id="1" name=""/>
+        <p:cNvGrpSpPr/>
+        <p:nvPr/>
+      </p:nvGrpSpPr>
+      <p:grpSpPr>
+        <a:xfrm>
+          <a:off x="0" y="0"/>
+          <a:ext cx="0" cy="0"/>
+          <a:chOff x="0" y="0"/>
+          <a:chExt cx="0" cy="0"/>
+        </a:xfrm>
+      </p:grpSpPr>
+      <p:sp>
+        <p:nvSpPr>
+          <p:cNvPr id="2" name="Title 1">
+            <a:extLst>
+              <a:ext uri="{FF2B5EF4-FFF2-40B4-BE49-F238E27FC236}">
+                <a16:creationId xmlns:a16="http://schemas.microsoft.com/office/drawing/2014/main" id="{93D3F7A9-CFFD-F204-C2D8-753CAC29C54F}"/>
+              </a:ext>
+            </a:extLst>
+          </p:cNvPr>
+          <p:cNvSpPr>
+            <a:spLocks noGrp="1"/>
+          </p:cNvSpPr>
+          <p:nvPr>
+            <p:ph type="title"/>
+          </p:nvPr>
+        </p:nvSpPr>
+        <p:spPr>
+          <a:xfrm>
+            <a:off x="646111" y="452718"/>
+            <a:ext cx="9404723" cy="763340"/>
+          </a:xfrm>
+        </p:spPr>
+        <p:txBody>
+          <a:bodyPr/>
+          <a:lstStyle/>
+          <a:p>
+            <a:r>
+              <a:rPr lang="en-US" dirty="0" err="1"/>
+              <a:t>PyPack</a:t>
+            </a:r>
+            <a:endParaRPr lang="en-US" dirty="0"/>
+          </a:p>
+        </p:txBody>
+      </p:sp>
+      <p:pic>
+        <p:nvPicPr>
+          <p:cNvPr id="5" name="Content Placeholder 4">
+            <a:extLst>
+              <a:ext uri="{FF2B5EF4-FFF2-40B4-BE49-F238E27FC236}">
+                <a16:creationId xmlns:a16="http://schemas.microsoft.com/office/drawing/2014/main" id="{60F42B29-240E-2BA8-A41D-E1DED7D5599D}"/>
+              </a:ext>
+            </a:extLst>
+          </p:cNvPr>
+          <p:cNvPicPr>
+            <a:picLocks noGrp="1" noChangeAspect="1"/>
+          </p:cNvPicPr>
+          <p:nvPr>
+            <p:ph idx="1"/>
+          </p:nvPr>
+        </p:nvPicPr>
+        <p:blipFill>
+          <a:blip r:embed="rId2"/>
+          <a:stretch>
+            <a:fillRect/>
+          </a:stretch>
+        </p:blipFill>
+        <p:spPr>
+          <a:xfrm>
+            <a:off x="8881460" y="1412314"/>
+            <a:ext cx="2949179" cy="4992968"/>
+          </a:xfrm>
+        </p:spPr>
+      </p:pic>
+      <p:sp>
+        <p:nvSpPr>
+          <p:cNvPr id="6" name="TextBox 5">
+            <a:extLst>
+              <a:ext uri="{FF2B5EF4-FFF2-40B4-BE49-F238E27FC236}">
+                <a16:creationId xmlns:a16="http://schemas.microsoft.com/office/drawing/2014/main" id="{B8BAF3B9-61C3-FE58-06EB-C95815CEDB3D}"/>
+              </a:ext>
+            </a:extLst>
+          </p:cNvPr>
+          <p:cNvSpPr txBox="1"/>
+          <p:nvPr/>
+        </p:nvSpPr>
+        <p:spPr>
+          <a:xfrm>
+            <a:off x="395926" y="1536569"/>
+            <a:ext cx="8276734" cy="4955203"/>
+          </a:xfrm>
+          <a:prstGeom prst="rect">
+            <a:avLst/>
+          </a:prstGeom>
+          <a:noFill/>
+        </p:spPr>
+        <p:txBody>
+          <a:bodyPr wrap="square" rtlCol="0">
+            <a:spAutoFit/>
+          </a:bodyPr>
+          <a:lstStyle/>
+          <a:p>
+            <a:r>
+              <a:rPr lang="en-US" sz="2800" dirty="0"/>
+              <a:t>Python packages help us stay organized! This way, similar tools, files, features, etc. can be grouped together.</a:t>
+            </a:r>
+            <a:br>
+              <a:rPr lang="en-US" sz="2800" dirty="0"/>
+            </a:br>
+            <a:r>
+              <a:rPr lang="en-US" sz="2800" dirty="0"/>
+              <a:t> </a:t>
+            </a:r>
+            <a:br>
+              <a:rPr lang="en-US" sz="2800" dirty="0"/>
+            </a:br>
+            <a:r>
+              <a:rPr lang="en-US" sz="2800" dirty="0"/>
+              <a:t>Packages are </a:t>
+            </a:r>
+            <a:r>
+              <a:rPr lang="en-US" sz="2800" dirty="0" err="1"/>
+              <a:t>distinquished</a:t>
+            </a:r>
+            <a:r>
+              <a:rPr lang="en-US" sz="2800" dirty="0"/>
+              <a:t> from directories by their __init__.py files; these files can either contain initialization code or be blank.</a:t>
+            </a:r>
+            <a:br>
+              <a:rPr lang="en-US" sz="2800" dirty="0"/>
+            </a:br>
+            <a:br>
+              <a:rPr lang="en-US" sz="2800" dirty="0"/>
+            </a:br>
+            <a:r>
+              <a:rPr lang="en-US" sz="2800" dirty="0"/>
+              <a:t>Packages can be used in multiple separate scripts simultaneously.</a:t>
+            </a:r>
+          </a:p>
+          <a:p>
+            <a:endParaRPr lang="en-US" dirty="0"/>
+          </a:p>
+          <a:p>
+            <a:endParaRPr lang="en-US" dirty="0"/>
+          </a:p>
+        </p:txBody>
+      </p:sp>
+    </p:spTree>
+    <p:extLst>
+      <p:ext uri="{BB962C8B-B14F-4D97-AF65-F5344CB8AC3E}">
+        <p14:creationId xmlns:p14="http://schemas.microsoft.com/office/powerpoint/2010/main" val="1583055521"/>
+      </p:ext>
+    </p:extLst>
+  </p:cSld>
+  <p:clrMapOvr>
+    <a:masterClrMapping/>
+  </p:clrMapOvr>
+</p:sld>
+</file>
+
+<file path=ppt/slides/slide6.xml><?xml version="1.0" encoding="utf-8"?>
+<p:sld xmlns:a="http://schemas.openxmlformats.org/drawingml/2006/main" xmlns:r="http://schemas.openxmlformats.org/officeDocument/2006/relationships" xmlns:p="http://schemas.openxmlformats.org/presentationml/2006/main">
+  <p:cSld>
+    <p:spTree>
+      <p:nvGrpSpPr>
+        <p:cNvPr id="1" name=""/>
+        <p:cNvGrpSpPr/>
+        <p:nvPr/>
+      </p:nvGrpSpPr>
+      <p:grpSpPr>
+        <a:xfrm>
+          <a:off x="0" y="0"/>
+          <a:ext cx="0" cy="0"/>
+          <a:chOff x="0" y="0"/>
+          <a:chExt cx="0" cy="0"/>
+        </a:xfrm>
+      </p:grpSpPr>
+      <p:sp>
+        <p:nvSpPr>
+          <p:cNvPr id="2" name="Title 1">
+            <a:extLst>
+              <a:ext uri="{FF2B5EF4-FFF2-40B4-BE49-F238E27FC236}">
+                <a16:creationId xmlns:a16="http://schemas.microsoft.com/office/drawing/2014/main" id="{93D3F7A9-CFFD-F204-C2D8-753CAC29C54F}"/>
+              </a:ext>
+            </a:extLst>
+          </p:cNvPr>
+          <p:cNvSpPr>
+            <a:spLocks noGrp="1"/>
+          </p:cNvSpPr>
+          <p:nvPr>
+            <p:ph type="title"/>
+          </p:nvPr>
+        </p:nvSpPr>
+        <p:spPr/>
+        <p:txBody>
+          <a:bodyPr/>
+          <a:lstStyle/>
+          <a:p>
+            <a:r>
+              <a:rPr lang="en-US" dirty="0" err="1"/>
+              <a:t>cmd</a:t>
+            </a:r>
+            <a:r>
+              <a:rPr lang="en-US" dirty="0"/>
+              <a:t> Module</a:t>
+            </a:r>
+          </a:p>
+        </p:txBody>
+      </p:sp>
+      <p:pic>
+        <p:nvPicPr>
+          <p:cNvPr id="9" name="Content Placeholder 8">
+            <a:extLst>
+              <a:ext uri="{FF2B5EF4-FFF2-40B4-BE49-F238E27FC236}">
+                <a16:creationId xmlns:a16="http://schemas.microsoft.com/office/drawing/2014/main" id="{8E829D18-D6C7-3E6F-339B-161EE14D4EE6}"/>
+              </a:ext>
+            </a:extLst>
+          </p:cNvPr>
+          <p:cNvPicPr>
+            <a:picLocks noGrp="1" noChangeAspect="1"/>
+          </p:cNvPicPr>
+          <p:nvPr>
+            <p:ph idx="1"/>
+          </p:nvPr>
+        </p:nvPicPr>
+        <p:blipFill>
+          <a:blip r:embed="rId2">
+            <a:extLst>
+              <a:ext uri="{28A0092B-C50C-407E-A947-70E740481C1C}">
+                <a14:useLocalDpi xmlns:a14="http://schemas.microsoft.com/office/drawing/2010/main" val="0"/>
+              </a:ext>
+            </a:extLst>
+          </a:blip>
+          <a:stretch>
+            <a:fillRect/>
+          </a:stretch>
+        </p:blipFill>
+        <p:spPr>
+          <a:xfrm>
+            <a:off x="8138245" y="1656712"/>
+            <a:ext cx="3825178" cy="4195762"/>
+          </a:xfrm>
+        </p:spPr>
+      </p:pic>
+      <p:sp>
+        <p:nvSpPr>
+          <p:cNvPr id="10" name="TextBox 9">
+            <a:extLst>
+              <a:ext uri="{FF2B5EF4-FFF2-40B4-BE49-F238E27FC236}">
+                <a16:creationId xmlns:a16="http://schemas.microsoft.com/office/drawing/2014/main" id="{C0534385-0367-79B0-9647-8943422F56BA}"/>
+              </a:ext>
+            </a:extLst>
+          </p:cNvPr>
+          <p:cNvSpPr txBox="1"/>
+          <p:nvPr/>
+        </p:nvSpPr>
+        <p:spPr>
+          <a:xfrm>
+            <a:off x="228577" y="1656712"/>
+            <a:ext cx="7758260" cy="4062651"/>
+          </a:xfrm>
+          <a:prstGeom prst="rect">
+            <a:avLst/>
+          </a:prstGeom>
+          <a:noFill/>
+        </p:spPr>
+        <p:txBody>
+          <a:bodyPr wrap="square" rtlCol="0">
+            <a:spAutoFit/>
+          </a:bodyPr>
+          <a:lstStyle/>
+          <a:p>
+            <a:pPr marL="342900" indent="-342900">
+              <a:buAutoNum type="arabicPeriod"/>
+            </a:pPr>
+            <a:r>
+              <a:rPr lang="en-US" sz="2400" dirty="0"/>
+              <a:t>First import the </a:t>
+            </a:r>
+            <a:r>
+              <a:rPr lang="en-US" sz="2400" dirty="0" err="1"/>
+              <a:t>cmd</a:t>
+            </a:r>
+            <a:r>
+              <a:rPr lang="en-US" sz="2400" dirty="0"/>
+              <a:t> module</a:t>
+            </a:r>
+          </a:p>
+          <a:p>
+            <a:pPr marL="342900" indent="-342900">
+              <a:buAutoNum type="arabicPeriod"/>
+            </a:pPr>
+            <a:r>
+              <a:rPr lang="en-US" sz="2400" dirty="0"/>
+              <a:t>Create a class that inherits from the </a:t>
+            </a:r>
+            <a:r>
+              <a:rPr lang="en-US" sz="2400" dirty="0" err="1"/>
+              <a:t>cmd.Cmd</a:t>
+            </a:r>
+            <a:endParaRPr lang="en-US" sz="2400" dirty="0"/>
+          </a:p>
+          <a:p>
+            <a:pPr marL="342900" indent="-342900">
+              <a:buAutoNum type="arabicPeriod"/>
+            </a:pPr>
+            <a:r>
+              <a:rPr lang="en-US" sz="2400" dirty="0"/>
+              <a:t>Create a .</a:t>
+            </a:r>
+            <a:r>
+              <a:rPr lang="en-US" sz="2400" dirty="0" err="1"/>
+              <a:t>cmdloop</a:t>
+            </a:r>
+            <a:r>
+              <a:rPr lang="en-US" sz="2400" dirty="0"/>
+              <a:t>() of said class (</a:t>
+            </a:r>
+            <a:r>
+              <a:rPr lang="en-US" sz="2400" dirty="0" err="1"/>
+              <a:t>class_here.cmdloop</a:t>
+            </a:r>
+            <a:r>
+              <a:rPr lang="en-US" sz="2400" dirty="0"/>
+              <a:t>())</a:t>
+            </a:r>
+          </a:p>
+          <a:p>
+            <a:pPr marL="342900" indent="-342900">
+              <a:buAutoNum type="arabicPeriod"/>
+            </a:pPr>
+            <a:r>
+              <a:rPr lang="en-US" sz="2400" dirty="0"/>
+              <a:t>Set the prompt to be displayed based on </a:t>
+            </a:r>
+            <a:r>
+              <a:rPr lang="en-US" sz="2400" dirty="0" err="1"/>
+              <a:t>tty</a:t>
+            </a:r>
+            <a:r>
+              <a:rPr lang="en-US" sz="2400" dirty="0"/>
+              <a:t> mode</a:t>
+            </a:r>
+          </a:p>
+          <a:p>
+            <a:pPr marL="342900" indent="-342900">
+              <a:buAutoNum type="arabicPeriod"/>
+            </a:pPr>
+            <a:r>
+              <a:rPr lang="en-US" sz="2400" dirty="0"/>
+              <a:t>Returning True breaks us out of the loop!</a:t>
+            </a:r>
+          </a:p>
+          <a:p>
+            <a:pPr marL="342900" indent="-342900">
+              <a:buAutoNum type="arabicPeriod"/>
+            </a:pPr>
+            <a:r>
+              <a:rPr lang="en-US" sz="2400" dirty="0"/>
+              <a:t>EOF (End of File) signal shortcut remains </a:t>
+            </a:r>
+            <a:r>
+              <a:rPr lang="en-US" sz="2400" dirty="0" err="1"/>
+              <a:t>Ctrl+D</a:t>
+            </a:r>
+            <a:r>
+              <a:rPr lang="en-US" sz="2400" dirty="0"/>
+              <a:t> (</a:t>
+            </a:r>
+            <a:r>
+              <a:rPr lang="en-US" sz="2400" dirty="0" err="1"/>
+              <a:t>do_EOF</a:t>
+            </a:r>
+            <a:r>
+              <a:rPr lang="en-US" sz="2400" dirty="0"/>
+              <a:t>)</a:t>
+            </a:r>
+          </a:p>
+          <a:p>
+            <a:pPr marL="342900" indent="-342900">
+              <a:buFontTx/>
+              <a:buAutoNum type="arabicPeriod"/>
+            </a:pPr>
+            <a:r>
+              <a:rPr lang="en-US" sz="2400" dirty="0"/>
+              <a:t>You now have a CLI similar to Simple Shell &gt;:D</a:t>
+            </a:r>
+          </a:p>
+          <a:p>
+            <a:pPr marL="342900" indent="-342900">
+              <a:buAutoNum type="arabicPeriod"/>
+            </a:pPr>
+            <a:endParaRPr lang="en-US" dirty="0"/>
+          </a:p>
+        </p:txBody>
+      </p:sp>
+    </p:spTree>
+    <p:extLst>
+      <p:ext uri="{BB962C8B-B14F-4D97-AF65-F5344CB8AC3E}">
+        <p14:creationId xmlns:p14="http://schemas.microsoft.com/office/powerpoint/2010/main" val="2402145529"/>
+      </p:ext>
+    </p:extLst>
+  </p:cSld>
+  <p:clrMapOvr>
+    <a:masterClrMapping/>
+  </p:clrMapOvr>
+</p:sld>
+</file>
+
+<file path=ppt/slides/slide7.xml><?xml version="1.0" encoding="utf-8"?>
+<p:sld xmlns:a="http://schemas.openxmlformats.org/drawingml/2006/main" xmlns:r="http://schemas.openxmlformats.org/officeDocument/2006/relationships" xmlns:p="http://schemas.openxmlformats.org/presentationml/2006/main">
+  <p:cSld>
+    <p:spTree>
+      <p:nvGrpSpPr>
+        <p:cNvPr id="1" name=""/>
+        <p:cNvGrpSpPr/>
+        <p:nvPr/>
+      </p:nvGrpSpPr>
+      <p:grpSpPr>
+        <a:xfrm>
+          <a:off x="0" y="0"/>
+          <a:ext cx="0" cy="0"/>
+          <a:chOff x="0" y="0"/>
+          <a:chExt cx="0" cy="0"/>
+        </a:xfrm>
+      </p:grpSpPr>
+      <p:sp>
+        <p:nvSpPr>
+          <p:cNvPr id="2" name="Title 1">
+            <a:extLst>
+              <a:ext uri="{FF2B5EF4-FFF2-40B4-BE49-F238E27FC236}">
+                <a16:creationId xmlns:a16="http://schemas.microsoft.com/office/drawing/2014/main" id="{93D3F7A9-CFFD-F204-C2D8-753CAC29C54F}"/>
+              </a:ext>
+            </a:extLst>
+          </p:cNvPr>
+          <p:cNvSpPr>
+            <a:spLocks noGrp="1"/>
+          </p:cNvSpPr>
+          <p:nvPr>
+            <p:ph type="title"/>
+          </p:nvPr>
+        </p:nvSpPr>
+        <p:spPr/>
+        <p:txBody>
+          <a:bodyPr/>
+          <a:lstStyle/>
+          <a:p>
+            <a:r>
+              <a:rPr lang="en-US" dirty="0"/>
+              <a:t>Testing test tests</a:t>
+            </a:r>
+          </a:p>
+        </p:txBody>
+      </p:sp>
+      <p:sp>
+        <p:nvSpPr>
+          <p:cNvPr id="3" name="Content Placeholder 2">
+            <a:extLst>
+              <a:ext uri="{FF2B5EF4-FFF2-40B4-BE49-F238E27FC236}">
+                <a16:creationId xmlns:a16="http://schemas.microsoft.com/office/drawing/2014/main" id="{A4F3318C-6AA4-BDDF-5101-32A3A4650D02}"/>
+              </a:ext>
+            </a:extLst>
+          </p:cNvPr>
+          <p:cNvSpPr>
+            <a:spLocks noGrp="1"/>
+          </p:cNvSpPr>
+          <p:nvPr>
+            <p:ph idx="1"/>
+          </p:nvPr>
+        </p:nvSpPr>
+        <p:spPr/>
+        <p:txBody>
+          <a:bodyPr>
+            <a:normAutofit/>
+          </a:bodyPr>
+          <a:lstStyle/>
+          <a:p>
+            <a:r>
+              <a:rPr lang="en-US" dirty="0"/>
+              <a:t>Your ‘tests’ directory usually goes at the base of your project repo.</a:t>
+            </a:r>
+          </a:p>
+          <a:p>
+            <a:r>
+              <a:rPr lang="en-US" dirty="0"/>
+              <a:t>Tests directory files mirror project architecture (e.g. /models/base.py is tested in /tests/</a:t>
+            </a:r>
+            <a:r>
+              <a:rPr lang="en-US" dirty="0" err="1"/>
+              <a:t>test_models</a:t>
+            </a:r>
+            <a:r>
+              <a:rPr lang="en-US" dirty="0"/>
+              <a:t>/test_base.py)</a:t>
+            </a:r>
+          </a:p>
+          <a:p>
+            <a:r>
+              <a:rPr lang="en-US" b="1" dirty="0"/>
+              <a:t>REMEMBER </a:t>
+            </a:r>
+            <a:r>
+              <a:rPr lang="en-US" dirty="0"/>
+              <a:t>to make a ‘tests/test_console.py’ even if it’s empty</a:t>
+            </a:r>
+          </a:p>
+          <a:p>
+            <a:r>
+              <a:rPr lang="en-US" dirty="0"/>
+              <a:t>Utilize setup &amp;&amp; teardown methods to govern behavior before and/or following a test (e.g. reset storage)</a:t>
+            </a:r>
+          </a:p>
+          <a:p>
+            <a:r>
+              <a:rPr lang="en-US" dirty="0"/>
+              <a:t>Have fun! Testing for test tests can be frustrating, so try to enjoy it.</a:t>
+            </a:r>
+          </a:p>
+          <a:p>
+            <a:r>
+              <a:rPr lang="en-US" dirty="0"/>
+              <a:t>python3 -m </a:t>
+            </a:r>
+            <a:r>
+              <a:rPr lang="en-US" dirty="0" err="1"/>
+              <a:t>unittest</a:t>
+            </a:r>
+            <a:r>
+              <a:rPr lang="en-US" dirty="0"/>
+              <a:t> discover tests</a:t>
+            </a:r>
+          </a:p>
+        </p:txBody>
+      </p:sp>
+    </p:spTree>
+    <p:extLst>
+      <p:ext uri="{BB962C8B-B14F-4D97-AF65-F5344CB8AC3E}">
+        <p14:creationId xmlns:p14="http://schemas.microsoft.com/office/powerpoint/2010/main" val="1296758433"/>
+      </p:ext>
+    </p:extLst>
+  </p:cSld>
+  <p:clrMapOvr>
+    <a:masterClrMapping/>
+  </p:clrMapOvr>
+</p:sld>
+</file>
+
 <file path=ppt/slides/slide8.xml><?xml version="1.0" encoding="utf-8"?>
 <p:sld xmlns:a="http://schemas.openxmlformats.org/drawingml/2006/main" xmlns:r="http://schemas.openxmlformats.org/officeDocument/2006/relationships" xmlns:p="http://schemas.openxmlformats.org/presentationml/2006/main">
   <p:cSld>
@@ -7358,17 +7650,17 @@
           <a:p>
             <a:r>
               <a:rPr lang="en-US" dirty="0"/>
-              <a:t>UWUID</a:t>
-            </a:r>
-          </a:p>
-        </p:txBody>
-      </p:sp>
-      <p:sp>
-        <p:nvSpPr>
-          <p:cNvPr id="3" name="Content Placeholder 2">
+              <a:t>Meet Jason!</a:t>
+            </a:r>
+          </a:p>
+        </p:txBody>
+      </p:sp>
+      <p:sp>
+        <p:nvSpPr>
+          <p:cNvPr id="4" name="Content Placeholder 2">
             <a:extLst>
               <a:ext uri="{FF2B5EF4-FFF2-40B4-BE49-F238E27FC236}">
-                <a16:creationId xmlns:a16="http://schemas.microsoft.com/office/drawing/2014/main" id="{A4F3318C-6AA4-BDDF-5101-32A3A4650D02}"/>
+                <a16:creationId xmlns:a16="http://schemas.microsoft.com/office/drawing/2014/main" id="{1884256D-97C8-8FF6-75CE-15438DE3B3A5}"/>
               </a:ext>
             </a:extLst>
           </p:cNvPr>
@@ -7381,361 +7673,441 @@
         </p:nvSpPr>
         <p:spPr>
           <a:xfrm>
-            <a:off x="358594" y="1411896"/>
-            <a:ext cx="11472045" cy="4993386"/>
+            <a:off x="1103313" y="2052638"/>
+            <a:ext cx="8947150" cy="4195762"/>
           </a:xfrm>
         </p:spPr>
         <p:txBody>
-          <a:bodyPr>
-            <a:normAutofit/>
-          </a:bodyPr>
+          <a:bodyPr/>
           <a:lstStyle/>
           <a:p>
-            <a:r>
-              <a:rPr lang="en-US" sz="2600" dirty="0"/>
-              <a:t>UUID === ‘Universally Unique Identifier’</a:t>
-            </a:r>
-          </a:p>
-          <a:p>
-            <a:r>
-              <a:rPr lang="en-US" sz="2600" dirty="0"/>
-              <a:t>Format: 8-4-4-4-12 for a total of 36 characters</a:t>
-            </a:r>
-          </a:p>
-          <a:p>
-            <a:r>
-              <a:rPr lang="en-US" sz="2600" dirty="0"/>
-              <a:t>From </a:t>
-            </a:r>
-            <a:r>
-              <a:rPr lang="en-US" sz="2600" dirty="0" err="1"/>
-              <a:t>uuid</a:t>
-            </a:r>
-            <a:r>
-              <a:rPr lang="en-US" sz="2600" dirty="0"/>
-              <a:t> import uuid4 </a:t>
-            </a:r>
-            <a:r>
-              <a:rPr lang="en-US" sz="2600" dirty="0">
-                <a:sym typeface="Wingdings" panose="05000000000000000000" pitchFamily="2" charset="2"/>
+            <a:pPr algn="l">
+              <a:buFont typeface="Arial" panose="020B0604020202020204" pitchFamily="34" charset="0"/>
+              <a:buChar char="•"/>
+            </a:pPr>
+            <a:r>
+              <a:rPr lang="en-US" sz="2800" b="0" i="0" dirty="0">
+                <a:solidFill>
+                  <a:srgbClr val="D1D5DB"/>
+                </a:solidFill>
+                <a:effectLst/>
+                <a:latin typeface="Söhne"/>
               </a:rPr>
-              <a:t> random number based</a:t>
-            </a:r>
-          </a:p>
-          <a:p>
-            <a:endParaRPr lang="en-US" sz="2600" dirty="0">
-              <a:sym typeface="Wingdings" panose="05000000000000000000" pitchFamily="2" charset="2"/>
+              <a:t>JSON stands for JavaScript Object Notation</a:t>
+            </a:r>
+          </a:p>
+          <a:p>
+            <a:pPr algn="l">
+              <a:buFont typeface="Arial" panose="020B0604020202020204" pitchFamily="34" charset="0"/>
+              <a:buChar char="•"/>
+            </a:pPr>
+            <a:r>
+              <a:rPr lang="en-US" sz="2800" b="0" i="0" dirty="0">
+                <a:solidFill>
+                  <a:srgbClr val="D1D5DB"/>
+                </a:solidFill>
+                <a:effectLst/>
+                <a:latin typeface="Söhne"/>
+              </a:rPr>
+              <a:t>JSON is a lightweight data-interchange format</a:t>
+            </a:r>
+          </a:p>
+          <a:p>
+            <a:pPr algn="l">
+              <a:buFont typeface="Arial" panose="020B0604020202020204" pitchFamily="34" charset="0"/>
+              <a:buChar char="•"/>
+            </a:pPr>
+            <a:r>
+              <a:rPr lang="en-US" sz="2800" b="0" i="0" dirty="0">
+                <a:solidFill>
+                  <a:srgbClr val="D1D5DB"/>
+                </a:solidFill>
+                <a:effectLst/>
+                <a:latin typeface="Söhne"/>
+              </a:rPr>
+              <a:t>It is easy for humans to read and write</a:t>
+            </a:r>
+          </a:p>
+          <a:p>
+            <a:pPr algn="l">
+              <a:buFont typeface="Arial" panose="020B0604020202020204" pitchFamily="34" charset="0"/>
+              <a:buChar char="•"/>
+            </a:pPr>
+            <a:r>
+              <a:rPr lang="en-US" sz="2800" b="0" i="0" dirty="0">
+                <a:solidFill>
+                  <a:srgbClr val="D1D5DB"/>
+                </a:solidFill>
+                <a:effectLst/>
+                <a:latin typeface="Söhne"/>
+              </a:rPr>
+              <a:t>It's easy for machines to parse and generate</a:t>
+            </a:r>
+          </a:p>
+          <a:p>
+            <a:pPr algn="l">
+              <a:buFont typeface="Arial" panose="020B0604020202020204" pitchFamily="34" charset="0"/>
+              <a:buChar char="•"/>
+            </a:pPr>
+            <a:r>
+              <a:rPr lang="en-US" sz="2800" b="0" i="0" dirty="0">
+                <a:solidFill>
+                  <a:srgbClr val="D1D5DB"/>
+                </a:solidFill>
+                <a:effectLst/>
+                <a:latin typeface="Söhne"/>
+              </a:rPr>
+              <a:t>JSON is a text format that is completely language independent</a:t>
+            </a:r>
+          </a:p>
+          <a:p>
+            <a:pPr algn="l">
+              <a:buFont typeface="Arial" panose="020B0604020202020204" pitchFamily="34" charset="0"/>
+              <a:buChar char="•"/>
+            </a:pPr>
+            <a:r>
+              <a:rPr lang="en-US" sz="2800" dirty="0">
+                <a:solidFill>
+                  <a:srgbClr val="D1D5DB"/>
+                </a:solidFill>
+                <a:latin typeface="Söhne"/>
+              </a:rPr>
+              <a:t>Python has built in </a:t>
+            </a:r>
+            <a:r>
+              <a:rPr lang="en-US" sz="2800" dirty="0" err="1">
+                <a:solidFill>
+                  <a:srgbClr val="D1D5DB"/>
+                </a:solidFill>
+                <a:latin typeface="Söhne"/>
+              </a:rPr>
+              <a:t>json</a:t>
+            </a:r>
+            <a:r>
+              <a:rPr lang="en-US" sz="2800" dirty="0">
+                <a:solidFill>
+                  <a:srgbClr val="D1D5DB"/>
+                </a:solidFill>
+                <a:latin typeface="Söhne"/>
+              </a:rPr>
+              <a:t> support (import </a:t>
+            </a:r>
+            <a:r>
+              <a:rPr lang="en-US" sz="2800" dirty="0" err="1">
+                <a:solidFill>
+                  <a:srgbClr val="D1D5DB"/>
+                </a:solidFill>
+                <a:latin typeface="Söhne"/>
+              </a:rPr>
+              <a:t>json</a:t>
+            </a:r>
+            <a:r>
+              <a:rPr lang="en-US" sz="2800" dirty="0">
+                <a:solidFill>
+                  <a:srgbClr val="D1D5DB"/>
+                </a:solidFill>
+                <a:latin typeface="Söhne"/>
+              </a:rPr>
+              <a:t>)</a:t>
+            </a:r>
+            <a:endParaRPr lang="en-US" sz="2800" b="0" i="0" dirty="0">
+              <a:solidFill>
+                <a:srgbClr val="D1D5DB"/>
+              </a:solidFill>
+              <a:effectLst/>
+              <a:latin typeface="Söhne"/>
             </a:endParaRPr>
           </a:p>
           <a:p>
             <a:pPr marL="0" indent="0">
               <a:buNone/>
             </a:pPr>
-            <a:r>
-              <a:rPr lang="en-US" sz="2600" dirty="0">
-                <a:sym typeface="Wingdings" panose="05000000000000000000" pitchFamily="2" charset="2"/>
-              </a:rPr>
-              <a:t>Helps us differentiate similar, but not the same, class instances</a:t>
-            </a:r>
-            <a:br>
-              <a:rPr lang="en-US" dirty="0">
-                <a:sym typeface="Wingdings" panose="05000000000000000000" pitchFamily="2" charset="2"/>
-              </a:rPr>
-            </a:br>
-            <a:br>
-              <a:rPr lang="en-US" dirty="0">
-                <a:sym typeface="Wingdings" panose="05000000000000000000" pitchFamily="2" charset="2"/>
-              </a:rPr>
-            </a:br>
-            <a:r>
-              <a:rPr lang="en-US" sz="1600" dirty="0">
-                <a:sym typeface="Wingdings" panose="05000000000000000000" pitchFamily="2" charset="2"/>
-              </a:rPr>
-              <a:t>e.g. [Cereal] (0b7b815f-137e-4d05-85db-95f8d4c840a7) {'id': '0b7b815f-137e-4d05-85db-95f8d4c840a7', '</a:t>
-            </a:r>
-            <a:r>
-              <a:rPr lang="en-US" sz="1600" dirty="0" err="1">
-                <a:sym typeface="Wingdings" panose="05000000000000000000" pitchFamily="2" charset="2"/>
-              </a:rPr>
-              <a:t>created_at</a:t>
-            </a:r>
-            <a:r>
-              <a:rPr lang="en-US" sz="1600" dirty="0">
-                <a:sym typeface="Wingdings" panose="05000000000000000000" pitchFamily="2" charset="2"/>
-              </a:rPr>
-              <a:t>': </a:t>
-            </a:r>
-            <a:r>
-              <a:rPr lang="en-US" sz="1600" dirty="0" err="1">
-                <a:sym typeface="Wingdings" panose="05000000000000000000" pitchFamily="2" charset="2"/>
-              </a:rPr>
-              <a:t>datetime.datetime</a:t>
-            </a:r>
-            <a:r>
-              <a:rPr lang="en-US" sz="1600" dirty="0">
-                <a:sym typeface="Wingdings" panose="05000000000000000000" pitchFamily="2" charset="2"/>
-              </a:rPr>
-              <a:t>(2023, 6, 7, 6, 4, 43, 109009), '</a:t>
-            </a:r>
-            <a:r>
-              <a:rPr lang="en-US" sz="1600" dirty="0" err="1">
-                <a:sym typeface="Wingdings" panose="05000000000000000000" pitchFamily="2" charset="2"/>
-              </a:rPr>
-              <a:t>updated_at</a:t>
-            </a:r>
-            <a:r>
-              <a:rPr lang="en-US" sz="1600" dirty="0">
-                <a:sym typeface="Wingdings" panose="05000000000000000000" pitchFamily="2" charset="2"/>
-              </a:rPr>
-              <a:t>': </a:t>
-            </a:r>
-            <a:r>
-              <a:rPr lang="en-US" sz="1600" dirty="0" err="1">
-                <a:sym typeface="Wingdings" panose="05000000000000000000" pitchFamily="2" charset="2"/>
-              </a:rPr>
-              <a:t>datetime.datetime</a:t>
-            </a:r>
-            <a:r>
-              <a:rPr lang="en-US" sz="1600" dirty="0">
-                <a:sym typeface="Wingdings" panose="05000000000000000000" pitchFamily="2" charset="2"/>
-              </a:rPr>
-              <a:t>(2023, 6, 7, 6, 4, 43, 109159), 'name': 'Cereal 19', '</a:t>
-            </a:r>
-            <a:r>
-              <a:rPr lang="en-US" sz="1600" dirty="0" err="1">
-                <a:sym typeface="Wingdings" panose="05000000000000000000" pitchFamily="2" charset="2"/>
-              </a:rPr>
-              <a:t>sugar_content</a:t>
-            </a:r>
-            <a:r>
-              <a:rPr lang="en-US" sz="1600" dirty="0">
-                <a:sym typeface="Wingdings" panose="05000000000000000000" pitchFamily="2" charset="2"/>
-              </a:rPr>
-              <a:t>': 99.99, '</a:t>
-            </a:r>
-            <a:r>
-              <a:rPr lang="en-US" sz="1600" dirty="0" err="1">
-                <a:sym typeface="Wingdings" panose="05000000000000000000" pitchFamily="2" charset="2"/>
-              </a:rPr>
-              <a:t>fiber_content</a:t>
-            </a:r>
-            <a:r>
-              <a:rPr lang="en-US" sz="1600" dirty="0">
-                <a:sym typeface="Wingdings" panose="05000000000000000000" pitchFamily="2" charset="2"/>
-              </a:rPr>
-              <a:t>': 199.99, '</a:t>
-            </a:r>
-            <a:r>
-              <a:rPr lang="en-US" sz="1600" dirty="0" err="1">
-                <a:sym typeface="Wingdings" panose="05000000000000000000" pitchFamily="2" charset="2"/>
-              </a:rPr>
-              <a:t>is_gluten_free</a:t>
-            </a:r>
-            <a:r>
-              <a:rPr lang="en-US" sz="1600" dirty="0">
-                <a:sym typeface="Wingdings" panose="05000000000000000000" pitchFamily="2" charset="2"/>
-              </a:rPr>
-              <a:t>': True, '</a:t>
-            </a:r>
-            <a:r>
-              <a:rPr lang="en-US" sz="1600" dirty="0" err="1">
-                <a:sym typeface="Wingdings" panose="05000000000000000000" pitchFamily="2" charset="2"/>
-              </a:rPr>
-              <a:t>expiration_date</a:t>
-            </a:r>
-            <a:r>
-              <a:rPr lang="en-US" sz="1600" dirty="0">
-                <a:sym typeface="Wingdings" panose="05000000000000000000" pitchFamily="2" charset="2"/>
-              </a:rPr>
-              <a:t>': 'Neva Witches', '</a:t>
-            </a:r>
-            <a:r>
-              <a:rPr lang="en-US" sz="1600" dirty="0" err="1">
-                <a:sym typeface="Wingdings" panose="05000000000000000000" pitchFamily="2" charset="2"/>
-              </a:rPr>
-              <a:t>shelf_life_days</a:t>
-            </a:r>
-            <a:r>
-              <a:rPr lang="en-US" sz="1600" dirty="0">
-                <a:sym typeface="Wingdings" panose="05000000000000000000" pitchFamily="2" charset="2"/>
-              </a:rPr>
-              <a:t>': 365, '</a:t>
-            </a:r>
-            <a:r>
-              <a:rPr lang="en-US" sz="1600" dirty="0" err="1">
-                <a:sym typeface="Wingdings" panose="05000000000000000000" pitchFamily="2" charset="2"/>
-              </a:rPr>
-              <a:t>flavor_complexity</a:t>
-            </a:r>
-            <a:r>
-              <a:rPr lang="en-US" sz="1600" dirty="0">
-                <a:sym typeface="Wingdings" panose="05000000000000000000" pitchFamily="2" charset="2"/>
-              </a:rPr>
-              <a:t>': '(2+3j)', '</a:t>
-            </a:r>
-            <a:r>
-              <a:rPr lang="en-US" sz="1600" dirty="0" err="1">
-                <a:sym typeface="Wingdings" panose="05000000000000000000" pitchFamily="2" charset="2"/>
-              </a:rPr>
-              <a:t>other_cereals</a:t>
-            </a:r>
-            <a:r>
-              <a:rPr lang="en-US" sz="1600" dirty="0">
-                <a:sym typeface="Wingdings" panose="05000000000000000000" pitchFamily="2" charset="2"/>
-              </a:rPr>
-              <a:t>': []}</a:t>
-            </a:r>
-          </a:p>
-          <a:p>
-            <a:pPr marL="0" indent="0">
-              <a:buNone/>
-            </a:pPr>
-            <a:r>
-              <a:rPr lang="en-US" sz="1600" dirty="0">
-                <a:sym typeface="Wingdings" panose="05000000000000000000" pitchFamily="2" charset="2"/>
-              </a:rPr>
-              <a:t>[Cereal] (f1f8ea78-d3ed-4b5f-8e88-ec31d9fcafba) {'id': 'f1f8ea78-d3ed-4b5f-8e88-ec31d9fcafba', '</a:t>
-            </a:r>
-            <a:r>
-              <a:rPr lang="en-US" sz="1600" dirty="0" err="1">
-                <a:sym typeface="Wingdings" panose="05000000000000000000" pitchFamily="2" charset="2"/>
-              </a:rPr>
-              <a:t>created_at</a:t>
-            </a:r>
-            <a:r>
-              <a:rPr lang="en-US" sz="1600" dirty="0">
-                <a:sym typeface="Wingdings" panose="05000000000000000000" pitchFamily="2" charset="2"/>
-              </a:rPr>
-              <a:t>': </a:t>
-            </a:r>
-            <a:r>
-              <a:rPr lang="en-US" sz="1600" dirty="0" err="1">
-                <a:sym typeface="Wingdings" panose="05000000000000000000" pitchFamily="2" charset="2"/>
-              </a:rPr>
-              <a:t>datetime.datetime</a:t>
-            </a:r>
-            <a:r>
-              <a:rPr lang="en-US" sz="1600" dirty="0">
-                <a:sym typeface="Wingdings" panose="05000000000000000000" pitchFamily="2" charset="2"/>
-              </a:rPr>
-              <a:t>(2023, 6, 7, 6, 25, 10, 97766), '</a:t>
-            </a:r>
-            <a:r>
-              <a:rPr lang="en-US" sz="1600" dirty="0" err="1">
-                <a:sym typeface="Wingdings" panose="05000000000000000000" pitchFamily="2" charset="2"/>
-              </a:rPr>
-              <a:t>updated_at</a:t>
-            </a:r>
-            <a:r>
-              <a:rPr lang="en-US" sz="1600" dirty="0">
-                <a:sym typeface="Wingdings" panose="05000000000000000000" pitchFamily="2" charset="2"/>
-              </a:rPr>
-              <a:t>': </a:t>
-            </a:r>
-            <a:r>
-              <a:rPr lang="en-US" sz="1600" dirty="0" err="1">
-                <a:sym typeface="Wingdings" panose="05000000000000000000" pitchFamily="2" charset="2"/>
-              </a:rPr>
-              <a:t>datetime.datetime</a:t>
-            </a:r>
-            <a:r>
-              <a:rPr lang="en-US" sz="1600" dirty="0">
-                <a:sym typeface="Wingdings" panose="05000000000000000000" pitchFamily="2" charset="2"/>
-              </a:rPr>
-              <a:t>(2023, 6, 7, 6, 25, 10, 98069), 'name': 'Cereal 19', '</a:t>
-            </a:r>
-            <a:r>
-              <a:rPr lang="en-US" sz="1600" dirty="0" err="1">
-                <a:sym typeface="Wingdings" panose="05000000000000000000" pitchFamily="2" charset="2"/>
-              </a:rPr>
-              <a:t>sugar_content</a:t>
-            </a:r>
-            <a:r>
-              <a:rPr lang="en-US" sz="1600" dirty="0">
-                <a:sym typeface="Wingdings" panose="05000000000000000000" pitchFamily="2" charset="2"/>
-              </a:rPr>
-              <a:t>': 99.99, '</a:t>
-            </a:r>
-            <a:r>
-              <a:rPr lang="en-US" sz="1600" dirty="0" err="1">
-                <a:sym typeface="Wingdings" panose="05000000000000000000" pitchFamily="2" charset="2"/>
-              </a:rPr>
-              <a:t>fiber_content</a:t>
-            </a:r>
-            <a:r>
-              <a:rPr lang="en-US" sz="1600" dirty="0">
-                <a:sym typeface="Wingdings" panose="05000000000000000000" pitchFamily="2" charset="2"/>
-              </a:rPr>
-              <a:t>': 199.99, '</a:t>
-            </a:r>
-            <a:r>
-              <a:rPr lang="en-US" sz="1600" dirty="0" err="1">
-                <a:sym typeface="Wingdings" panose="05000000000000000000" pitchFamily="2" charset="2"/>
-              </a:rPr>
-              <a:t>is_gluten_free</a:t>
-            </a:r>
-            <a:r>
-              <a:rPr lang="en-US" sz="1600" dirty="0">
-                <a:sym typeface="Wingdings" panose="05000000000000000000" pitchFamily="2" charset="2"/>
-              </a:rPr>
-              <a:t>': True, '</a:t>
-            </a:r>
-            <a:r>
-              <a:rPr lang="en-US" sz="1600" dirty="0" err="1">
-                <a:sym typeface="Wingdings" panose="05000000000000000000" pitchFamily="2" charset="2"/>
-              </a:rPr>
-              <a:t>expiration_date</a:t>
-            </a:r>
-            <a:r>
-              <a:rPr lang="en-US" sz="1600" dirty="0">
-                <a:sym typeface="Wingdings" panose="05000000000000000000" pitchFamily="2" charset="2"/>
-              </a:rPr>
-              <a:t>': 'Neva Witches', '</a:t>
-            </a:r>
-            <a:r>
-              <a:rPr lang="en-US" sz="1600" dirty="0" err="1">
-                <a:sym typeface="Wingdings" panose="05000000000000000000" pitchFamily="2" charset="2"/>
-              </a:rPr>
-              <a:t>shelf_life_days</a:t>
-            </a:r>
-            <a:r>
-              <a:rPr lang="en-US" sz="1600" dirty="0">
-                <a:sym typeface="Wingdings" panose="05000000000000000000" pitchFamily="2" charset="2"/>
-              </a:rPr>
-              <a:t>': 365, '</a:t>
-            </a:r>
-            <a:r>
-              <a:rPr lang="en-US" sz="1600" dirty="0" err="1">
-                <a:sym typeface="Wingdings" panose="05000000000000000000" pitchFamily="2" charset="2"/>
-              </a:rPr>
-              <a:t>flavor_complexity</a:t>
-            </a:r>
-            <a:r>
-              <a:rPr lang="en-US" sz="1600" dirty="0">
-                <a:sym typeface="Wingdings" panose="05000000000000000000" pitchFamily="2" charset="2"/>
-              </a:rPr>
-              <a:t>': (2+3j), '</a:t>
-            </a:r>
-            <a:r>
-              <a:rPr lang="en-US" sz="1600" dirty="0" err="1">
-                <a:sym typeface="Wingdings" panose="05000000000000000000" pitchFamily="2" charset="2"/>
-              </a:rPr>
-              <a:t>other_cereals</a:t>
-            </a:r>
-            <a:r>
-              <a:rPr lang="en-US" sz="1600" dirty="0">
-                <a:sym typeface="Wingdings" panose="05000000000000000000" pitchFamily="2" charset="2"/>
-              </a:rPr>
-              <a:t>': []}</a:t>
-            </a:r>
-            <a:endParaRPr lang="en-US" sz="1600" dirty="0"/>
+            <a:endParaRPr lang="en-US" dirty="0"/>
           </a:p>
         </p:txBody>
       </p:sp>
     </p:spTree>
     <p:extLst>
       <p:ext uri="{BB962C8B-B14F-4D97-AF65-F5344CB8AC3E}">
-        <p14:creationId xmlns:p14="http://schemas.microsoft.com/office/powerpoint/2010/main" val="1957479903"/>
+        <p14:creationId xmlns:p14="http://schemas.microsoft.com/office/powerpoint/2010/main" val="1380080184"/>
+      </p:ext>
+    </p:extLst>
+  </p:cSld>
+  <p:clrMapOvr>
+    <a:masterClrMapping/>
+  </p:clrMapOvr>
+</p:sld>
+</file>
+
+<file path=ppt/slides/slide9.xml><?xml version="1.0" encoding="utf-8"?>
+<p:sld xmlns:a="http://schemas.openxmlformats.org/drawingml/2006/main" xmlns:r="http://schemas.openxmlformats.org/officeDocument/2006/relationships" xmlns:p="http://schemas.openxmlformats.org/presentationml/2006/main">
+  <p:cSld>
+    <p:spTree>
+      <p:nvGrpSpPr>
+        <p:cNvPr id="1" name=""/>
+        <p:cNvGrpSpPr/>
+        <p:nvPr/>
+      </p:nvGrpSpPr>
+      <p:grpSpPr>
+        <a:xfrm>
+          <a:off x="0" y="0"/>
+          <a:ext cx="0" cy="0"/>
+          <a:chOff x="0" y="0"/>
+          <a:chExt cx="0" cy="0"/>
+        </a:xfrm>
+      </p:grpSpPr>
+      <p:sp>
+        <p:nvSpPr>
+          <p:cNvPr id="2" name="Title 1">
+            <a:extLst>
+              <a:ext uri="{FF2B5EF4-FFF2-40B4-BE49-F238E27FC236}">
+                <a16:creationId xmlns:a16="http://schemas.microsoft.com/office/drawing/2014/main" id="{93D3F7A9-CFFD-F204-C2D8-753CAC29C54F}"/>
+              </a:ext>
+            </a:extLst>
+          </p:cNvPr>
+          <p:cNvSpPr>
+            <a:spLocks noGrp="1"/>
+          </p:cNvSpPr>
+          <p:nvPr>
+            <p:ph type="title"/>
+          </p:nvPr>
+        </p:nvSpPr>
+        <p:spPr/>
+        <p:txBody>
+          <a:bodyPr/>
+          <a:lstStyle/>
+          <a:p>
+            <a:r>
+              <a:rPr lang="en-US" dirty="0"/>
+              <a:t>I’m Super Serial-</a:t>
+            </a:r>
+            <a:r>
+              <a:rPr lang="en-US" dirty="0" err="1"/>
+              <a:t>izing</a:t>
+            </a:r>
+            <a:endParaRPr lang="en-US" dirty="0"/>
+          </a:p>
+        </p:txBody>
+      </p:sp>
+      <p:sp>
+        <p:nvSpPr>
+          <p:cNvPr id="5" name="Content Placeholder 4">
+            <a:extLst>
+              <a:ext uri="{FF2B5EF4-FFF2-40B4-BE49-F238E27FC236}">
+                <a16:creationId xmlns:a16="http://schemas.microsoft.com/office/drawing/2014/main" id="{9F0B1957-B2F9-4BE4-7FBE-AE2CEF656DB0}"/>
+              </a:ext>
+            </a:extLst>
+          </p:cNvPr>
+          <p:cNvSpPr>
+            <a:spLocks noGrp="1"/>
+          </p:cNvSpPr>
+          <p:nvPr>
+            <p:ph idx="1"/>
+          </p:nvPr>
+        </p:nvSpPr>
+        <p:spPr>
+          <a:xfrm>
+            <a:off x="1263568" y="1383616"/>
+            <a:ext cx="8946541" cy="614868"/>
+          </a:xfrm>
+        </p:spPr>
+        <p:txBody>
+          <a:bodyPr>
+            <a:normAutofit fontScale="85000" lnSpcReduction="10000"/>
+          </a:bodyPr>
+          <a:lstStyle/>
+          <a:p>
+            <a:pPr marL="0" indent="0">
+              <a:buNone/>
+            </a:pPr>
+            <a:r>
+              <a:rPr lang="en-US" dirty="0"/>
+              <a:t>&lt;class '</a:t>
+            </a:r>
+            <a:r>
+              <a:rPr lang="en-US" dirty="0" err="1"/>
+              <a:t>BaseModel</a:t>
+            </a:r>
+            <a:r>
+              <a:rPr lang="en-US" dirty="0"/>
+              <a:t>'&gt; -&gt; </a:t>
+            </a:r>
+            <a:r>
+              <a:rPr lang="en-US" dirty="0" err="1"/>
+              <a:t>to_dict</a:t>
+            </a:r>
+            <a:r>
+              <a:rPr lang="en-US" dirty="0"/>
+              <a:t>() -&gt; &lt;class '</a:t>
+            </a:r>
+            <a:r>
+              <a:rPr lang="en-US" dirty="0" err="1"/>
+              <a:t>dict</a:t>
+            </a:r>
+            <a:r>
+              <a:rPr lang="en-US" dirty="0"/>
+              <a:t>'&gt; -&gt; JSON dump -&gt; &lt;class 'str'&gt; -&gt; FILE -&gt; &lt;class 'str'&gt; -&gt; JSON load -&gt; &lt;class '</a:t>
+            </a:r>
+            <a:r>
+              <a:rPr lang="en-US" dirty="0" err="1"/>
+              <a:t>dict</a:t>
+            </a:r>
+            <a:r>
+              <a:rPr lang="en-US" dirty="0"/>
+              <a:t>'&gt; -&gt; &lt;class '</a:t>
+            </a:r>
+            <a:r>
+              <a:rPr lang="en-US" dirty="0" err="1"/>
+              <a:t>BaseModel</a:t>
+            </a:r>
+            <a:r>
+              <a:rPr lang="en-US" dirty="0"/>
+              <a:t>'&gt;</a:t>
+            </a:r>
+          </a:p>
+        </p:txBody>
+      </p:sp>
+      <p:sp>
+        <p:nvSpPr>
+          <p:cNvPr id="8" name="TextBox 7">
+            <a:extLst>
+              <a:ext uri="{FF2B5EF4-FFF2-40B4-BE49-F238E27FC236}">
+                <a16:creationId xmlns:a16="http://schemas.microsoft.com/office/drawing/2014/main" id="{99DD621C-81AF-3A0B-6EA0-6E6733F79ABA}"/>
+              </a:ext>
+            </a:extLst>
+          </p:cNvPr>
+          <p:cNvSpPr txBox="1"/>
+          <p:nvPr/>
+        </p:nvSpPr>
+        <p:spPr>
+          <a:xfrm>
+            <a:off x="693621" y="2149311"/>
+            <a:ext cx="11080833" cy="2031325"/>
+          </a:xfrm>
+          <a:prstGeom prst="rect">
+            <a:avLst/>
+          </a:prstGeom>
+          <a:noFill/>
+        </p:spPr>
+        <p:txBody>
+          <a:bodyPr wrap="square" rtlCol="0">
+            <a:spAutoFit/>
+          </a:bodyPr>
+          <a:lstStyle/>
+          <a:p>
+            <a:r>
+              <a:rPr lang="en-US" dirty="0"/>
+              <a:t>{"Cereal.0b7b815f-137e-4d05-85db-95f8d4c840a7":</a:t>
+            </a:r>
+          </a:p>
+          <a:p>
+            <a:r>
+              <a:rPr lang="en-US" dirty="0"/>
+              <a:t>	{"id": "0b7b815f-137e-4d05-85db-95f8d4c840a7",</a:t>
+            </a:r>
+          </a:p>
+          <a:p>
+            <a:r>
+              <a:rPr lang="en-US" dirty="0"/>
+              <a:t>	 "</a:t>
+            </a:r>
+            <a:r>
+              <a:rPr lang="en-US" dirty="0" err="1"/>
+              <a:t>created_at</a:t>
+            </a:r>
+            <a:r>
+              <a:rPr lang="en-US" dirty="0"/>
+              <a:t>": "2023-06-07T06:04:43.109009", "</a:t>
+            </a:r>
+            <a:r>
+              <a:rPr lang="en-US" dirty="0" err="1"/>
+              <a:t>updated_at</a:t>
+            </a:r>
+            <a:r>
+              <a:rPr lang="en-US" dirty="0"/>
+              <a:t>": "2023-06-07T06:04:43.109159", 	   	 "name": "Cereal 19", "</a:t>
+            </a:r>
+            <a:r>
+              <a:rPr lang="en-US" dirty="0" err="1"/>
+              <a:t>sugar_content</a:t>
+            </a:r>
+            <a:r>
+              <a:rPr lang="en-US" dirty="0"/>
+              <a:t>": 99.99,</a:t>
+            </a:r>
+          </a:p>
+          <a:p>
+            <a:r>
+              <a:rPr lang="en-US" dirty="0"/>
+              <a:t>	 "</a:t>
+            </a:r>
+            <a:r>
+              <a:rPr lang="en-US" dirty="0" err="1"/>
+              <a:t>fiber_content</a:t>
+            </a:r>
+            <a:r>
+              <a:rPr lang="en-US" dirty="0"/>
+              <a:t>": 199.99, "</a:t>
+            </a:r>
+            <a:r>
+              <a:rPr lang="en-US" dirty="0" err="1"/>
+              <a:t>is_gluten_free</a:t>
+            </a:r>
+            <a:r>
+              <a:rPr lang="en-US" dirty="0"/>
+              <a:t>": true,</a:t>
+            </a:r>
+          </a:p>
+          <a:p>
+            <a:r>
+              <a:rPr lang="en-US" dirty="0"/>
+              <a:t>	 "</a:t>
+            </a:r>
+            <a:r>
+              <a:rPr lang="en-US" dirty="0" err="1"/>
+              <a:t>expiration_date</a:t>
+            </a:r>
+            <a:r>
+              <a:rPr lang="en-US" dirty="0"/>
+              <a:t>": "Neva Witches", "</a:t>
+            </a:r>
+            <a:r>
+              <a:rPr lang="en-US" dirty="0" err="1"/>
+              <a:t>shelf_life_days</a:t>
+            </a:r>
+            <a:r>
+              <a:rPr lang="en-US" dirty="0"/>
+              <a:t>": 365,</a:t>
+            </a:r>
+          </a:p>
+          <a:p>
+            <a:r>
+              <a:rPr lang="en-US" dirty="0"/>
+              <a:t>	 "</a:t>
+            </a:r>
+            <a:r>
+              <a:rPr lang="en-US" dirty="0" err="1"/>
+              <a:t>flavor_complexity</a:t>
+            </a:r>
+            <a:r>
+              <a:rPr lang="en-US" dirty="0"/>
+              <a:t>": "(2+3j)", "</a:t>
+            </a:r>
+            <a:r>
+              <a:rPr lang="en-US" dirty="0" err="1"/>
+              <a:t>other_cereals</a:t>
+            </a:r>
+            <a:r>
+              <a:rPr lang="en-US" dirty="0"/>
+              <a:t>": [], "__class__": "Cereal"}}</a:t>
+            </a:r>
+          </a:p>
+        </p:txBody>
+      </p:sp>
+    </p:spTree>
+    <p:extLst>
+      <p:ext uri="{BB962C8B-B14F-4D97-AF65-F5344CB8AC3E}">
+        <p14:creationId xmlns:p14="http://schemas.microsoft.com/office/powerpoint/2010/main" val="4284632038"/>
       </p:ext>
     </p:extLst>
   </p:cSld>

</xml_diff>